<commit_message>
semana 5 sesion 3
</commit_message>
<xml_diff>
--- a/Recursos/4. Express.pptx
+++ b/Recursos/4. Express.pptx
@@ -5,10 +5,10 @@
     <p:sldMasterId id="2147483745" r:id="rId4"/>
   </p:sldMasterIdLst>
   <p:notesMasterIdLst>
-    <p:notesMasterId r:id="rId16"/>
+    <p:notesMasterId r:id="rId20"/>
   </p:notesMasterIdLst>
   <p:handoutMasterIdLst>
-    <p:handoutMasterId r:id="rId17"/>
+    <p:handoutMasterId r:id="rId21"/>
   </p:handoutMasterIdLst>
   <p:sldIdLst>
     <p:sldId id="389" r:id="rId5"/>
@@ -20,8 +20,12 @@
     <p:sldId id="388" r:id="rId11"/>
     <p:sldId id="386" r:id="rId12"/>
     <p:sldId id="387" r:id="rId13"/>
-    <p:sldId id="369" r:id="rId14"/>
-    <p:sldId id="326" r:id="rId15"/>
+    <p:sldId id="396" r:id="rId14"/>
+    <p:sldId id="393" r:id="rId15"/>
+    <p:sldId id="397" r:id="rId16"/>
+    <p:sldId id="394" r:id="rId17"/>
+    <p:sldId id="395" r:id="rId18"/>
+    <p:sldId id="326" r:id="rId19"/>
   </p:sldIdLst>
   <p:sldSz cx="12188825" cy="6858000"/>
   <p:notesSz cx="6858000" cy="9144000"/>
@@ -237,7 +241,7 @@
             <a:pPr algn="r" rtl="0"/>
             <a:fld id="{C8F1D84B-F747-4821-8617-FBD61E8F4308}" type="datetime1">
               <a:rPr lang="es-ES" smtClean="0"/>
-              <a:t>01/11/2022</a:t>
+              <a:t>03/11/2022</a:t>
             </a:fld>
             <a:endParaRPr lang="es-ES" dirty="0"/>
           </a:p>
@@ -367,7 +371,7 @@
   <inkml:trace contextRef="#ctx0" brushRef="#br0" timeOffset="24452.54">5045 10372 0,'0'17'32,"0"54"-32,0-18 0,0 17 15,0 19-15,0-54 16,0 35-1,0 89 1,0-124 0,-36 18-16,36-17 15,-17 69 1,-1-34 0,-17-18-1,35-35-15,0 17 16,-18-18-16,1 1 15,17 17-15,0-17 188,53 0-157,-18-18-31,-18 0 0,36 17 16,-35-17-16,17 0 15,-17 0-15,0 0 16</inkml:trace>
   <inkml:trace contextRef="#ctx0" brushRef="#br0" timeOffset="49837.49">29139 3140 0,'0'-18'15,"18"18"1,17 0 0,1 0-16,52 0 31,-53 0-31,0 0 16,1 0-16,52 0 31,-70 0-16,-1 0-15,1 0 16,35 0 0,-36 0-1,19 0 1,-36 18 0,17-18-16,1 0 31,17 0 125</inkml:trace>
   <inkml:trace contextRef="#ctx0" brushRef="#br0" timeOffset="65461.83">27869 7867 0,'18'18'31,"17"-1"-15,18 19-16,-17-19 15,-1 54-15,35 52 16,-17 1-16,-17-19 15,-19 72-15,54-36 16,-54-53-16,19 36 16,-1-1-16,0 1 15,-17-36-15,0 0 16,-1-35-16,-17-18 16,0-88 109,-17-35-110,-72-159 1,72 141-16,-54-88 15,36 35-15,-36 1 16,71 34-16,-35-17 16,35 71-16,0 17 15,0-18-15,0-17 32,0 53-32,0 17 15,0-17-15,0-18 16,18 18-1,-1 35-15,1-18 16,-18-17-16,0-1 16,18 19-1,-1 17-15,1 0 16,17-36 0,159 36 15,-141 18-16,-35 17-15,52 36 16,1 123 0,-54-123-1,19-19-15,-1 37 16,-35-72-16,0 19 16,0-1-16,0-18 15,0 1-15,0 17 16,0-17-1,0 35-15,-18-35 16,-35-1-16,1-17 16,34 18-16,-53 17 15,36-35 1,17 0 0,-17 18-16,70-18 140,107 17-124,-90 1-1,1 0-15,0 17 16,-17-17-16,-1 17 16,18 0-16,-18-17 15,18 17-15,-35 0 16,-1 18-16,19-35 16,-1 17-16,-35-17 15,53 35-15,-18-18 16,-17 0-1,-1-35-15</inkml:trace>
-  <inkml:trace contextRef="#ctx0" brushRef="#br0" timeOffset="70336.21">952 13776 0,'18'0'16,"17"18"-16,-35-1 16,0 54-16,0-1 15,0 54-15,-17 176 31,-1-212-31,-52 35 16,52-52-16,18-18 16,0 0-16,-18 0 15,-17 17-15,35-140 110,0-283-95,0 194-15,0-35 16,0 35-16,0 89 16,0-36-16,18 71 15,-1-18-15,-17 35 31,18 18 16,0 0-31,34 0 0,19 35-16,-36 36 15,36 52-15,-36-52 16,18 35-16,-18-53 31,18 0-31,-17-36 16,-1 19-16,-35-19 31,53-17 0,70-106-15,-35-52-16,-35 34 15,36-52-15,34-71 16,-52 106-16,-19-18 16,-16 71-16,17-18 15,-53 71 1,17 35 31,1 0-32,0 0-15,70 300 32,-71-195-32,-17 54 15,0 35-15,0-35 16,0 17-16,0 1 16,0-36-16,-35 53 15,-18-71-15,-35 142 31,88-230-31,0-17 297,-18-1-281</inkml:trace>
+  <inkml:trace contextRef="#ctx0" brushRef="#br0" timeOffset="70336.2">952 13776 0,'18'0'16,"17"18"-16,-35-1 16,0 54-16,0-1 15,0 54-15,-17 176 31,-1-212-31,-52 35 16,52-52-16,18-18 16,0 0-16,-18 0 15,-17 17-15,35-140 110,0-283-95,0 194-15,0-35 16,0 35-16,0 89 16,0-36-16,18 71 15,-1-18-15,-17 35 31,18 18 16,0 0-31,34 0 0,19 35-16,-36 36 15,36 52-15,-36-52 16,18 35-16,-18-53 31,18 0-31,-17-36 16,-1 19-16,-35-19 31,53-17 0,70-106-15,-35-52-16,-35 34 15,36-52-15,34-71 16,-52 106-16,-19-18 16,-16 71-16,17-18 15,-53 71 1,17 35 31,1 0-32,0 0-15,70 300 32,-71-195-32,-17 54 15,0 35-15,0-35 16,0 17-16,0 1 16,0-36-16,-35 53 15,-18-71-15,-35 142 31,88-230-31,0-17 297,-18-1-281</inkml:trace>
   <inkml:trace contextRef="#ctx0" brushRef="#br0" timeOffset="82124.32">8343 8008 0,'0'0'0,"0"35"15,0 36-15,0-36 16,18 89-16,-18-71 16,17 35-16,-17 35 15,36 18-15,-36-17 16,0-18-16,0 17 16,0 159-1,0-141-15,0-35 16,0 35-16,0-17 15,0-36-15,0 18 16,0 17-16,0-34 16,0 16-16,0-16 15,0 105 1,0-141-16,0-1 16,0-16-16,0-19 15,0 1-15,0 0 31,0-1-15,0 36 203,0 53-204,0-35-15,0-1 16,0 18-16,0 230 31,0-195-31,0-70 16,0 18 0,0 88-1,0-124-15,0 0 16,-18 0-1,18 71 1,-18-35-16,18-18 16,-35 70-16,18-35 15,17 18 1,-18-35-16,18 17 16,-18-18-16,18-52 15,0 35 48,-17 35-48,17-17-15,-18-36 16,18 18-16,-18 0 16,18-35-16,0-1 15,0 1-15,0-1 31,-17 1-15,17 0 62,35-1 0,71-17-62,-36 0-16,89 0 16,35-53-16,-53 53 15,0 0-15,1 0 16,-54 0-16,0 0 15,-18 0 1,-52 0-16,0 0 16,-1 0-1,19 0 1,17 0 0,-36 0-16,18 18 15,-17-18-15,17 0 16,-17 0-16,0 0 15</inkml:trace>
   <inkml:trace contextRef="#ctx0" brushRef="#br0" timeOffset="83420.31">8361 7938 0,'53'0'16,"17"0"-1,-52 0-15,52 0 16,1 0-16,0 0 16,-1 0-16,-17 0 15,-18 0-15,36 0 16,-53 0-16,52 0 16,-52 0-16,52 0 15,-17 0-15,-35 0 16,35 0-16,-36 0 15,1 0 1,0 0-16,17 0 31,0 0-15,-17 0 0,0 0-1,17 0-15,-18 0 16,1 0-16,17 0 15,-17 0-15,17 0 16,106 0 0,-88 0-1,18 0-15,-18 0 16,35 0-16,106 0 31,-106 0-31,0 0 16,1 0-16,158-36 31,-195 36-31,-16 0 16,-19 0 15</inkml:trace>
   <inkml:trace contextRef="#ctx0" brushRef="#br0" timeOffset="85476.02">10777 6350 0,'0'88'31,"0"0"-15,18 36-1,17 229 1,-35-212-16,0 17 16,0 19-1,0 158 1,0-194-16,0 71 15,-17-89-15,-1 18 16,-17 0-16,35-17 16,-36-18-16,1-36 15,35 1-15,0-1 16,-17-17-16,17 0 16,-18 18-16,18-36 15,0-17 1,0-1-1,0-34 110,53-36-109,0-18 0,0 54-16,0-1 15,-1 0-15,19 18 16,-36 0-16,36-17 16,17 17-16,-17 0 15,-1 0-15,195 0 31,-177 0-31,-17 35 16,17-35-16,-35 0 16,17 18-16,-17-18 15,-18 0-15,18 0 16,0 0-16,-18 0 16,36 0-16,0 0 15,-19 0-15,-16 0 16,34-18-1,-52 0-15,0 18 16,-1 0 0,1 0 15,0-17-15,17-19-16,-18 36 15,1-17 1,17-18-1,-17 35-15,0-53 16,-1 17-16,1-17 16,0-17-16,-18 35 15,17-71-15,36-53 16,-53 53-16,0-17 16,0-54-16,0-17 15,0-35 1,0 88-16,0 0 15,0-89 1,0 89-16,0 18 16,0 70-16,18-53 15,-1 36-15,-17-19 16,0 54-16,0-18 16,36 0-16,-36 36 15,0-19-15,17-17 16,-17 36-1,0-1 142,-17 18-157,-72 35 15,19-17-15,-54 0 16,-34-18-16,-442 0 31,371 0-31,70 0 16,35 0-16,-17 0 31,124 0-31</inkml:trace>
@@ -388,16 +392,107 @@
   <inkml:trace contextRef="#ctx0" brushRef="#br0" timeOffset="142340.29">11218 6738 0,'18'0'16,"0"0"-16,-1 0 16,-17 53-16,36 0 15,-19 0-15,-17 0 16,0 0-16,0-36 15,0 19 1,0-1-16,0-18 16,53 1 171,35-18-171,0 0-16,18 0 15,-17 0-15,-1 0 16,-35 0-16,-36 0 16</inkml:trace>
   <inkml:trace contextRef="#ctx0" brushRef="#br0" timeOffset="144987.68">11536 7726 0,'-18'0'78,"18"35"-78,0 124 31,0-106-15,0-36-16,0 36 0,0-35 31,-17 0 0,-1-1-31,36 1 125,-1-18-78,1 0-47,-1 0 31,19 0-31,-19 0 32,36 0-17,0 0 1,-35 0 0,0 0-16,17 0 15,-18 0 1,19 0-1,-19 0 1,1 0 31,-36 0 94,-70 0-126,53 0 1,0-18-16,-1 18 0,19 0 15,-1 0 1,0 0-16,-17-17 16,17-1-16,18 0 0,-35 1 15,18-1 1,17-17 0,-18 17-16,18 1 15,0-19-15,-35 19 16,35-19-16,-18-34 15,18 52 1,0-17 0,0 17 46,0 1-31,18 17-15,35-18 0,-36 18-1,36 0-15,-35 0 16,17-18-16,0 18 16,18 0-16,-17 0 15,16 0 1,1 0-16,-35 0 15,0 0-15,-1 0 16,1 0 0</inkml:trace>
   <inkml:trace contextRef="#ctx0" brushRef="#br0" timeOffset="147164.09">11324 8608 0,'18'0'16,"17"0"-16,-17 0 15,35 17 1,0 19 0,-18-19-1,18 1 1,-53 0 0,17-18-16,1 17 31,-18 1-31,18-18 15,17 0 157,106-229-140,-123 211-32,35-53 15,-36 54-15,-17-1 16,18 18-1,-36 18 298,-70 52-282,35-52-31,36 0 16,-1-1-1,-17 1-15,17-18 0,0 0 16,1 35 0,-19-17-16,-34-1 31,52 1 63,18 0 15,-17-18 0,-1 0-77,0 0-32,-35 0 15,18 0 1,-18-18-16,18-17 16,0-1-16,17 36 15,0 0-15,1 0 16,-1-17 15,-17 17 0,-1-35 1</inkml:trace>
-  <inkml:trace contextRef="#ctx0" brushRef="#br0" timeOffset="149452.42">9719 12259 0,'53'0'15,"-106"0"-15,212 0 16,-106 0-16,17 0 16,-17 0-16,88 0 31,-53 0-31,1 0 0,-19 0 15,1 0-15,17 0 16,-35 0-16,17 0 16,-17 0-16,18 0 15,-1 0-15,36 18 16,18 35-16,-54-53 16,19 17-16,-1-17 15,159 35 16,-194-35-31,0 18 16,-1-18 15,-34 18-31,0-18 16,-1 0-16,54 17 16,-36-17-1,-17 0-15,17 0 16,-17 0-16,88 18 31,-18 0-31,-53-1 16,18-17-16,0 18 15,-36-18-15,54 0 16,-36 0-16,1 0 16,-1 0-16,18 0 15,0 0-15,-36 0 16,19 0-16</inkml:trace>
+  <inkml:trace contextRef="#ctx0" brushRef="#br0" timeOffset="149452.41">9719 12259 0,'53'0'15,"-106"0"-15,212 0 16,-106 0-16,17 0 16,-17 0-16,88 0 31,-53 0-31,1 0 0,-19 0 15,1 0-15,17 0 16,-35 0-16,17 0 16,-17 0-16,18 0 15,-1 0-15,36 18 16,18 35-16,-54-53 16,19 17-16,-1-17 15,159 35 16,-194-35-31,0 18 16,-1-18 15,-34 18-31,0-18 16,-1 0-16,54 17 16,-36-17-1,-17 0-15,17 0 16,-17 0-16,88 18 31,-18 0-31,-53-1 16,18-17-16,0 18 15,-36-18-15,54 0 16,-36 0-16,1 0 16,-1 0-16,18 0 15,0 0-15,-36 0 16,19 0-16</inkml:trace>
   <inkml:trace contextRef="#ctx0" brushRef="#br0" timeOffset="150500.69">9772 12965 0,'18'0'16,"-1"0"-1,36 0-15,-35 0 0,52 0 16,1 0-16,-18 0 16,247 17 15,-194 1-31,17 0 16,18-1-16,353 36 31,-300-35-31,-18-1 15,-34 1-15,-37 17 16,1-35-16,212 124 31,-265-124-31,-1 17 16,-16 1-16,-19-18 31,19 18-31,-19-1 16,1-17-1,17 0 1,18 18 0,0-18-16,0 18 15,0-18-15,-35 0 16,34 17-16,-52 1 16,18-18 46,17 0-31</inkml:trace>
   <inkml:trace contextRef="#ctx0" brushRef="#br0" timeOffset="151572.34">9931 13847 0,'17'17'63,"19"-17"-48,52 18-15,53-18 16,-18 0 0,71 35-16,-17-35 15,17 0-15,511 0 31,-511 0-31,-17 0 16,-36 0-16,18 0 16,88 18-1,-194-1-15,-1-17 16,19 18-16,-36-18 16,36 35-16,-36-17 15,53 0-15,-70-18 16,35 17-16,-35 1 15,-1-18-15,1 0 16,17 17 0</inkml:trace>
   <inkml:trace contextRef="#ctx0" brushRef="#br0" timeOffset="154243.54">11201 11836 0,'0'35'46,"0"-17"-30,-18 17-16,0 0 16,18-17-1,0 17-15,-35-17 16,35-1 0,0 1-16,0 0 46,-18-1-30,1 1 78,17-53-63,0 17-15,0-35-16,17 0 31,19 36-31,-1-1 16,0 18 15,-17 0-31,0 0 15,-1 0 1,19 0 0,-19 0-1,1 0 1,-1 0-16,1 18 16,0-1-16,-1 1 15,1 17-15,0-17 16,-1-1-16,-17 1 15,0 0 1,0-1 0,0 1-1,0 0 1</inkml:trace>
-  <inkml:trace contextRef="#ctx0" brushRef="#br0" timeOffset="154909.32">11218 12118 0,'18'-18'47,"0"18"-31,-1-17-1,1 17-15,0 0 16,-1 0 0,1 0-16,-1 0 15,1 0-15,0 0 47,-1 0-47,1 0 31,0 0-15</inkml:trace>
-  <inkml:trace contextRef="#ctx0" brushRef="#br0" timeOffset="155964.48">11695 11959 0,'17'18'16,"1"17"-16,-18 0 15,35 36-15,-35-18 16,0 0-16,18 17 15,-18-52-15,0 35 16,0-18-16,-18-53 109,18-123-77,0 124-32,0-36 15,0-18 1,0 54-16,0-36 16,0 35-16,0-17 15,18-18 16,-1 35-31,19-17 16,-19 17 0,19 1-1,-19 17 1,1 0 0,0 0-1,-1 0 1,18 0-16,-17 0 15,17 0-15,18 0 47,-53 35-15,0-17-17,0 35 16,0-36-15,-17 1-16,-19-18 31,19 0 1,-1 0-17,0 0 16,1 0-31,-1 0 16,-17 0 15,17 0-15,-17 35-16</inkml:trace>
+  <inkml:trace contextRef="#ctx0" brushRef="#br0" timeOffset="154909.31">11218 12118 0,'18'-18'47,"0"18"-31,-1-17-1,1 17-15,0 0 16,-1 0 0,1 0-16,-1 0 15,1 0-15,0 0 47,-1 0-47,1 0 31,0 0-15</inkml:trace>
+  <inkml:trace contextRef="#ctx0" brushRef="#br0" timeOffset="155964.47">11695 11959 0,'17'18'16,"1"17"-16,-18 0 15,35 36-15,-35-18 16,0 0-16,18 17 15,-18-52-15,0 35 16,0-18-16,-18-53 109,18-123-77,0 124-32,0-36 15,0-18 1,0 54-16,0-36 16,0 35-16,0-17 15,18-18 16,-1 35-31,19-17 16,-19 17 0,19 1-1,-19 17 1,1 0 0,0 0-1,-1 0 1,18 0-16,-17 0 15,17 0-15,18 0 47,-53 35-15,0-17-17,0 35 16,0-36-15,-17 1-16,-19-18 31,19 0 1,-1 0-17,0 0 16,1 0-31,-1 0 16,-17 0 15,17 0-15,-17 35-16</inkml:trace>
   <inkml:trace contextRef="#ctx0" brushRef="#br0" timeOffset="157171.51">10636 12400 0,'0'0'0,"0"35"15,0 1-15,0-1 16,18 18-16,-18-35 15,0 34-15,0-34 16,0 35-16,0-35 16,0 35-16,0-36 15,0 36 17,0 0-32,0-18 15,0 1-15,0-19 16,0 1-16,18 0 140,-1-18-124,1-36-16,17 36 16,-17 0-16,17 0 15,18 0 17,-18 0-32,-17 0 46,-18-17 95</inkml:trace>
   <inkml:trace contextRef="#ctx0" brushRef="#br0" timeOffset="158357.22">11183 12471 0,'0'0'0,"0"53"16,0-18-16,18 35 15,-18-34-15,17-1 16,-17-17-16,0 17 15,0 0-15,0 18 32,-17-53 93,-1 0-110,18-18-15,-18 1 0,18-36 16,0-18-16,0 36 16,0-71 15,0 89-31,0-1 0,0-17 31,36 35-15,-19-18-1,19 18 1,-19 0 0,19 0-1,-19 0-15,18 0 16,18 0-1,-17 18-15,-19-1 16,19 1 0,-19-18-16,1 35 15,-1-35 1,-17 18 31,18 0-32,-18-1 17,-70 54-1,52-71-31,-35 17 16,18-17-1,-18 0 1,18 0-1,17 0 79,0 0-78,1 0 78</inkml:trace>
   <inkml:trace contextRef="#ctx0" brushRef="#br0" timeOffset="161022.18">10389 13176 0,'18'0'32,"0"18"-17,17 141 17,-17-124-32,-1 35 15,-17-34-15,35-1 16,-17 18-16,-18 17 15,0-52-15,18 0 16,17 17-16,-35-17 16,18-18-1,17 17 32,-17-17-31,17 36-1,-18-36 1,1 17 0,-18 1-1,0-36 95,18-193-79,17 140-31,-17 36 16,-1-18-16,-17-18 15,18 71-15,-18-53 16,35 36-1,-35-19 1,0 19 0,18 17-16,-18-18 15,0 1 1,17-19 0,-17 1-16,0 17 15,0 1 1,0-1 31,18 18-32,0 0 32,-18 18-31</inkml:trace>
   <inkml:trace contextRef="#ctx0" brushRef="#br0" timeOffset="162131.63">11060 13494 0,'17'0'62,"1"17"-62,-1 19 16,19 17 0,-19-53-1,-17 17 1,18 1 15,0-18 0,-1 17-15,1-17 15,0 0 16,-1 0-31,1 0-16,35 0 15,-18-70 1,-35-1-16,35 36 16,-17-18-16,0-17 15,-1 52-15,-17-53 16,36 36-16</inkml:trace>
+</inkml:ink>
+</file>
+
+<file path=ppt/ink/ink2.xml><?xml version="1.0" encoding="utf-8"?>
+<inkml:ink xmlns:inkml="http://www.w3.org/2003/InkML">
+  <inkml:definitions>
+    <inkml:context xml:id="ctx0">
+      <inkml:inkSource xml:id="inkSrc0">
+        <inkml:traceFormat>
+          <inkml:channel name="X" type="integer" max="1920" units="cm"/>
+          <inkml:channel name="Y" type="integer" max="1080" units="cm"/>
+          <inkml:channel name="T" type="integer" max="2.14748E9" units="dev"/>
+        </inkml:traceFormat>
+        <inkml:channelProperties>
+          <inkml:channelProperty channel="X" name="resolution" value="62.13592" units="1/cm"/>
+          <inkml:channelProperty channel="Y" name="resolution" value="62.06897" units="1/cm"/>
+          <inkml:channelProperty channel="T" name="resolution" value="1" units="1/dev"/>
+        </inkml:channelProperties>
+      </inkml:inkSource>
+      <inkml:timestamp xml:id="ts0" timeString="2022-11-04T01:22:02.569"/>
+    </inkml:context>
+    <inkml:brush xml:id="br0">
+      <inkml:brushProperty name="width" value="0.05292" units="cm"/>
+      <inkml:brushProperty name="height" value="0.05292" units="cm"/>
+      <inkml:brushProperty name="color" value="#FF0000"/>
+    </inkml:brush>
+  </inkml:definitions>
+  <inkml:trace contextRef="#ctx0" brushRef="#br0">25541 5098 0,'-18'70'16,"18"18"-16,53 89 15,18 34-15,0 54 16,-1-18-16,-52 70 15,52 54-15,-34 35 16,-1 140-16,-35-87 16,106 141-16,-89-1 15,-17-16-15,0-19 16,0-35-16,0-123 16,0 0-16,0-54 15,0-105-15,0-17 16,0-19-16,0-70 15,0 36-15,0-89 16,18 0-16,-18-17 16,0-54-16,0 36 15,0-35 1,0-1 0,0 19-1,0-1 1,0 18-16,0 18 15,0-1-15,0-35 16,0 36-16,0-18 16,0 17-16,0-52 15,0 0-15,0 17 16,70-17 78,19-18-94,87 0 15,-70 0-15,123 0 16,-35 0-16,36 0 16,-36 0-16,52 0 15,-16 0-15,52 0 16,71-18-16,-71 0 15,36-70-15,-54 70 16,-17 1-16,18-1 16,-71-35-1,-53 36-15,-18-1 16,18 18-16,-17 0 16,17 0-16,-53 0 15,0 0-15,-35 0 16,0 0-16,-18 0 15,1 0-15,17 0 16,0 0-16,-18 0 16,18 0-1,-36 0 1,1-18-16,0 18 31,-1 0-31,19-35 16,-1 35-16,0 0 15,0 0-15,-17 0 16,0 0-16,-1 0 16,1 0-1,17 0 1,-35-18 0,36 1-1,-19-18 1,18 17-16,1-35 15,17-53-15,-36-17 16,54-89-16,-54 18 16,19-88-16,34-53 15,-70 35-15,0 0 16,0-141-16,0 106 16,0-141-16,0 140 15,-35-105-15,0 18 16,-53-18-16,35 53 15,0 71-15,0 34 16,53 89-16,-18 18 16,18 35-16,0 17 15,0 18-15,0-17 16,0-18-16,0 53 16,0-18-16,0 18 15,0 0-15,0-1 16,0 19-16,0-18 15,0-18-15,0 18 16,0-1-16,0 19 16,0-1-16,0 18 15,0 0 1,0-17-16,0-1 16,0 54-16,0-54 15,0 53-15,0-52 16,0 35-16,0-18 15,0 0-15,0 0 16,-17 18-16,17-18 16,-18 17-16,18-17 15,-18 1-15,1 16 16,17 19-16,-36-19 16,36 19-16,0-19 31,-17 19-16,-1 17 1,18-18 15,-18 18-31,1 0 16,-36 0-16,-18 0 16,18 0-16,-52 0 15,-37 0-15,-34 0 16,-53 0-16,-18 0 15,-35 0-15,-106 0 16,88 0 0,-88 0-16,88 0 0,-18 0 15,89 0 1,35 0-16,88 0 16,18 0-16,0 0 15,-18 18-15,71-1 16,-54-17-16,19 18 15,35-18-15,-71 18 16,53-18-16,-53 35 16,53-35-16,-53 35 15,36-17-15,-1 17 16,53-35-16,1 0 16,-1 18-16,-17-1 15,17-17 1,-35 0-1,36 0 1,-36 0-16,18 18 16,-1-18-16,1 18 15,0-18-15,-36 0 16,18 0-16,-17 17 16,-1-17-16,-17 18 15,17-18-15,54 18 16</inkml:trace>
+  <inkml:trace contextRef="#ctx0" brushRef="#br0" timeOffset="1363.4">26635 5574 0,'-18'18'47,"36"34"-47,17 37 16,-17 16-16,-1-16 15,1-36-15,-18 17 16,18-17-16,-18-35 16,0 17-16,0 18 15,0-35 63</inkml:trace>
+  <inkml:trace contextRef="#ctx0" brushRef="#br0" timeOffset="2056.32">26229 5239 0,'53'0'0,"-35"0"16,-1 0-16,36 0 15,-35 0-15,35 0 16,0 0-16,-18 0 16,0 0-16,18 0 15,0 0-15,-35 0 16,17 0-16,-17 0 15,52 0 1,-17 0 0,-35 0-16,35 0 15,-36 0-15,36 0 16,-18 0-16,1 0 16,-1 0-16,18 0 15,-35 0 16</inkml:trace>
+  <inkml:trace contextRef="#ctx0" brushRef="#br0" timeOffset="2647.76">26511 5662 0,'0'0'0,"53"0"15,-35 0-15,52 0 16,-17 18-16,-17-18 16,34 0-16,-17 0 15,0 0-15,-18 0 16,18 0-16,-35 0 15,-1 0-15,19 0 16,-19 0 0,1 0-16,0 0 15,-1 0 1,1 0 0,17 0-1</inkml:trace>
+  <inkml:trace contextRef="#ctx0" brushRef="#br0" timeOffset="3431.03">27340 5909 0,'-17'18'31,"17"-1"-31,0 36 16,0-35-16,0 52 15,0-34-15,17 17 16,-17-18-16,0-17 31,0-107 47,0 36-62,-17-35-16,17 0 16,0 53-16,0-18 15,-18 18-15,18 17 16,0 0 0</inkml:trace>
+  <inkml:trace contextRef="#ctx0" brushRef="#br0" timeOffset="4527.56">27746 5750 0,'0'0'0,"-53"0"15,18 18 1,-1 17-16,-16 0 15,16-17-15,19 0 16,-1-1-16,0 19 16,-17-19-16,35 19 31,0-19-31,0 18 16,0-17-16,0 0 15,18 17-15,35-17 16,-18-18-1,18 0 1,-18 35-16,18-35 0,18 0 16,-18 18-16,-1-18 15,1 0-15,18 0 16,-36 0-16,18 0 16,0 0-1,-18 0-15,18 0 16,-35 0-16,0-18 15,-18-17 1,0 17 0,0-17-1,0-1-15,0 19 16,-18-36-16,0 35 16,-35-17-16,18 17 15,0 1-15,-1-1 16,19 18-16,-1 0 15,1 0 1,-1 0 0,-17 0-1,17 0 1,0 0 15,1 0-15,-1 0-1,0 0 1,-17 0 0</inkml:trace>
+  <inkml:trace contextRef="#ctx0" brushRef="#br0" timeOffset="5672.38">28698 6032 0,'0'36'16,"18"17"-16,0 0 16,-1 0-16,1-1 15,0-34-15,-1 35 16,-17-124 78,-35 36-79,17-53-15,1 53 16,17-1-16,0 1 15,0-18-15,0 36 47,0-1-31,0 0 0,17-17-16,19 17 15,-1 18-15,18-35 16,0 0-16,-18 17 15,18-17-15,0 17 16,0 18 15,-36 0-15,36 0 0,-17 36-1,-36-1-15,0-18 16,35 54-16,-35-53 15,18-1-15,-18 19 16,0 16-16,0-34 31,0 0 32</inkml:trace>
+  <inkml:trace contextRef="#ctx0" brushRef="#br0" timeOffset="6271.56">29792 5098 0,'18'35'32,"-18"35"-32,17-17 15,-17 71-15,0-36 16,0-35-16,36 88 31,-19-53-31,-17-35 0,0-35 16,0 17-16,0-17 125</inkml:trace>
+  <inkml:trace contextRef="#ctx0" brushRef="#br0" timeOffset="6839.54">29545 5697 0,'53'0'16,"35"0"-1,-35 0-15,0 0 16,0 0-16,18 0 15,-36 0-15,0 0 16,-17 0-16,-1 0 16,1 0-1,0 0 1,17-35 0,-17 35-1,-1 0 1,1 0-1,-1 0 1</inkml:trace>
+  <inkml:trace contextRef="#ctx0" brushRef="#br0" timeOffset="7535.32">27481 3828 0</inkml:trace>
+  <inkml:trace contextRef="#ctx0" brushRef="#br0" timeOffset="7991.13">27517 4180 0</inkml:trace>
+  <inkml:trace contextRef="#ctx0" brushRef="#br0" timeOffset="9423.51">27887 3316 0,'0'0'0,"18"0"15,17 0-15,18 0 16,-18 0-16,-17 0 16,35 0-16,-36 0 15,19 0-15,-1 0 16,0 18-1,1 17-15,-19 36 16,-17-19 0,0-16-1,0 17-15,0 0 16,0-36 0,0 36-16,-53 0 15,18 0 1,17-53-16,-17 0 15,17 0 1,1 18-16,-1-18 16,0 0-16,1 0 15,-1 0 48,36 0-1,70 0-46,88 0-16,1 35 16,-18 0-16,-36-17 15,0-1-15,-34 19 16,-19-19-16,1 1 15,-71 0-15,35-1 16,-17 1-16,-18 0 16,17 17-16,-17-17 15,0 52-15,0-17 16,0-35-16,0 35 16,0-36-16,-17 18 15,-1 1-15,0-19 16,1 1-1,-18 0-15,-1-18 16,36 17-16,-53-17 16,53 18-16,-35-18 15,-18 0-15,-17 0 16,-1 0-16,36 0 16,-53 0-1,-54 0-15,37 0 16,-19 0-16,36 0 15,0 0-15,0 0 16,35 0-16,17 0 16,1 0-16</inkml:trace>
+  <inkml:trace contextRef="#ctx0" brushRef="#br0" timeOffset="10503.4">29439 3334 0,'-17'35'15,"17"-17"-15,-53 105 16,35-88-16,0 36 16,1 17-16,17-35 15,-35 35-15,35 0 16,0-35-16,0 36 15,0-1-15,0 0 16,0-53-16,0 18 16,17 0-16,18-18 15,1-17 1,-1 0-16,-17-1 16,17-17-16,18 0 15,0 0-15,-36 0 16,36 0-16,-35 0 15,35-17-15,-18-36 16,0 0-16,-17 18 16,0-36-16,-18 18 15,0 0 1,0-35-16,0 0 16,0 0-16,-18-36 0,0 71 15,1-53 1,-1 53-16,-17-17 15,17-1-15,-17 18 16,17 36-16,1-19 16,-1 19-16,0-1 15,-17 18-15,0-17 16,0 17 0,-36 0-1,36 0-15,-18 0 16,0 0-16,-18 0 15,-17 0-15,35 0 16,0 0-16,18 0 16,17 0-16,1 0 31,-1 35-15,18 0-1,0-17 1,0-1-1</inkml:trace>
+  <inkml:trace contextRef="#ctx0" brushRef="#br0" timeOffset="11615.5">30145 3387 0,'0'0'16,"-53"0"-1,35 0-15,1 35 16,17 18-16,-36 0 16,19-36-16,17 54 15,0-36-15,0 1 16,0 34-16,0-17 16,0-18-16,0 18 15,0 18-15,0-18 16,0-18-16,0 0 15,0 18-15,0 0 16,0-35-16,0 35 16,17 0-16,1-18 15,0-18-15,-1 1 16,1 0 0,0-18-16,17 17 15,-18-17-15,-17 18 16,36-18-16,-19 0 15,36 0 1,0 0 0,-35 0-16,17-18 15,-17 1-15,17-36 16,-17-18-16,-1-17 16,-17 0-16,0 17 15,0 1-15,0-54 16,0 71-16,0 0 15,0-17-15,0 17 16,0 35-16,0-17 16,0 17-16,0 1 15,-17 17-15,-1 0 16,18-18 0,-53 18-16,36 0 15,-19-35-15,1 35 16,-18 0-16,18-18 15,17 18-15,-35 0 16,18-17 0,17 17-1</inkml:trace>
+  <inkml:trace contextRef="#ctx0" brushRef="#br0" timeOffset="12679.44">30956 3316 0,'0'-18'31,"-17"36"-15,17 53-1,-36-1-15,36-35 16,-17 71-16,17-35 15,-18 35-15,18-36 16,0-17-16,0 18 16,0-36-16,0 18 15,0 35-15,0-70 16,0 17-16,0-17 16,18-1-1,-1 1-15,36 0 16,-35-18-1,17 17 1,0-17 0,-17 0-16,0 0 15,-1 0-15,1 0 16,17 0 0,-17-17-16,-18-19 15,18 1-15,-18-35 16,0 17-16,0-36 15,0 1-15,0-18 16,0 18-16,0 18 16,0-19-16,0 1 15,0 71-15,-18-19 16,0-17-16,18 36 16,-17-1-16,-1 0 15,18 1-15,-35-1 16,17 1-16,0-1 15,1 18 17,-1 0-17,-17 0 17,17 0-17,1 0 1,-1 0-1,0 0-15,1 0 16</inkml:trace>
+  <inkml:trace contextRef="#ctx0" brushRef="#br0" timeOffset="18344.56">25735 6985 0,'0'0'0,"35"0"0,18 0 15,247 0 1,-141 0 0,70 0-16,1 0 15,581 0 1,-423 0 0,-123 0-16,211 0 15,-18 0-15,-52 0 16,0 0-16,-53 0 15,-106 0-15,17 0 16,-52 0-16,-1-35 16,-17-1-16,-141 36 15,-17-17-15,-54 17 266,0 0-250,1 0-1,-19 0 1</inkml:trace>
+  <inkml:trace contextRef="#ctx0" brushRef="#br0" timeOffset="22127.31">13282 5627 0,'0'106'16,"0"17"-16,18 1 15,17 70-15,-35-18 16,0 36-16,0 105 16,0-35-16,0 54 15,0 122-15,0 18 16,0 36-16,0-53 15,0 176-15,0-106 16,0-18-16,0-52 16,0-53-16,35-36 15,18-88-15,-18-17 16,1-36-16,-19-35 16,1-18-16,53-52 15,-71-54-15,17-34 16,-17 34-1,35-34-15,-17-1 16,-18 0 15,0-17-15,18-1-16,-18 1 16,35 17-16,-17-17 15,-18 17 1,17-17-1,1 0 17,53-18 30,17 0-46,35 35-16,124 0 15,71 18-15,17-18 16,141 36-16,88 17 16,36-17-16,159-36 15,17 124-15,18-18 16,35-71 0,-177 36-16,71-35 15,-123 35-15,-141 17 16,-159-70-16,-18 17 15,-141-52-15,-18 17 16,-52 1-16,-36-36 16,-17 0-16,0 17 15,-1-17 32,18 0-47,-17-17 16,0-19-1,-1 19-15,19-36 16,17-18-16,17-52 16,-17 17-16,-18-18 15,71-52-15,-53 0 16,0-18-16,-35-36 16,34-52-16,-52-71 15,0 18-15,0-88 16,0-36-16,-158-105 15,-54-89-15,36 18 16,-1-35-16,1 35 16,17 106-1,36 70-15,34 124 16,19 53-16,35-36 16,-36 89-16,36 17 15,17 36-15,18 17 16,0 18-16,0 53 15,0 0-15,0 17 16,0-17-16,0 53 16,0-1-16,0-17 15,0 18-15,0-18 16,0 0-16,0 36 16,0-54-16,0 36 15,0 0-15,0-18 16,0 17-16,0 19 15,0-36-15,0-18 16,0 18-16,0-35 16,0 35-16,0 0 15,0-35-15,0 0 16,0 35-16,0 0 16,0 0-16,0 18 15,0 17-15,0 1 16,0-19-1,0 19-15,-17-1 110,-36 18-95,17 0 1,-52 18-16,0-18 16,-88 17-16,-54 36 15,-87 0-15,-107-35 16,1 52-16,-71-17 16,18-17-16,0-19 15,-1 19-15,89 16 16,-17-52-16,158 0 15,70 0-15,36 0 16,35 18-16,-35-18 16,36 18-16,16-18 15,54 0-15,-36 0 16,36 0-16,0 0 16,-18 0-1,35 0-15,1 0 16,-1 0-16,0 0 47,1 0-32,-1 0-15,-17 0 16,0 0-16,-36 0 16,-52 0-16,-19 0 15,-52 0-15,-17 0 16,-1 0-16,-52 0 15,52 0-15,0 0 16,53 53-16,1-36 16,122-17-16,1 18 15,18-18-15,-1 0 32,0 0-17,1 0 1,-1 0-1,-17 0 17,17 0-17,0 0-15,-17 0 16,17 0 0,-17 0-16,0 0 15,17 0-15,-17 0 16,-18 18-16,35-18 15,-17 0-15,-35 35 16,34-35 0,-17 17-1,-17-17 1,-1 0-16,-17 0 16,35 0-16,-35 0 15,70 0-15,-17 0 16,17 0-16,1 0 31,-1 18 157,18 53-173,0-1-15,0 1 16,0 35-16,35-36 15,-35 1-15,18 52 16,-18 1-16,0 17 16,0-35-16,0-18 15,0-53-15,0-17 16,0-1-16</inkml:trace>
+  <inkml:trace contextRef="#ctx0" brushRef="#br0" timeOffset="23575.56">13406 6879 0,'35'0'31,"18"0"-31,35 18 16,35-1-16,19 1 15,52-18-15,35 0 16,18 18-16,17-18 16,72 0-16,69 0 15,-52 0-15,106 0 16,17 0-16,-70 0 15,-71 0-15,70 0 16,-87 0-16,-36 0 16,-35 0-16,35 0 15,1 0-15,-37 0 16,1 0 0,18 0-16,-53 0 15,-36 0-15,-52 0 16,-19 0-16,-52 0 15,18 0-15,-1 0 16,1 0-16,-36 0 16,36 0-16,35 0 15,52 0-15,19 0 16,-1 0-16,18 17 16,-17 36-16,-54-35 15,-35-18-15,-35 18 16,0-18-16,0 0 15,-35 0 1</inkml:trace>
+  <inkml:trace contextRef="#ctx0" brushRef="#br0" timeOffset="25687.19">14940 6315 0,'0'0'0,"18"141"16,-18-124-1,0-52 142,0-35-157,-71-54 0,36 1 15,-18 52 1,35-52-16,1 34 16,-54-16-16,71 69 15,0-34-15,0 35 16,0 17-1,0 0 1,18-17 0,-18 17-1,17 18 1,1-17 0,0-19-16,-1 19 15,1-1 1,0 18-16,-18-17 15,17 17-15,1 0 32,0 0-17,17 0-15,18 0 16,0 0 0,-18 0-16,0 0 15,-17 0-15,0 0 16,17 0-1,0 0 1,-35 17-16,18 18 16,17 18-1,-35-35 1,0 17-16,0-17 16,0 0-16,0-1 15,-35 36-15,-1-35 16,1-1-16,0 19 15,17-36-15,1 17 16,-1-17-16,0 0 16,1 18-16,-19-18 15,36 18 126,53-18-141,18 17 16,17-17-16,0 18 15,-52-1-15,87 36 16,-88-35-16,18 0 15,0-1-15,-53 1 16,18-18-16,-1 0 47,-17 18-16,0-1-31,0 18 16,0-17-16,0 17 15,-17 1-15,-54 17 16,54-36-16,-72 36 16,54-18-16,-35 18 15,34-17-15,-52 17 16,70-36-16,-17-17 16,18 0-1,-1 0-15,0 0 16,-17 0-16,0 0 15,17 0 1,-35 0-16,35 0 16,1 0-1,-18 0-15,17 0 16,0 0 0,1 0-16,-1 0 15,0 0 1</inkml:trace>
+  <inkml:trace contextRef="#ctx0" brushRef="#br0" timeOffset="26991.06">15981 6068 0,'0'0'0,"-18"0"15,-17 0 1,0 0-16,17 0 16,0 0-16,-17 0 15,17 0-15,-17 17 16,0 19-16,35-19 16,-35 1-1,17 0-15,18-1 16,-18-17-16,18 18 15,0 17-15,0 0 16,0-17-16,0 0 16,0 17-16,0 0 15,18 1-15,0-1 16,-1-35-16,19 0 16,-1 17-16,18 1 15,-18 0-15,-17-18 16,35 17-16,-18-17 15,-18 0 1,1 0 0,17 0-16,-17 0 15,0 0 1,-1-17 0,-17-19-1,0 19-15,0-1 16,18-35-16,-18 36 15,0-54-15,0 53 16,0 1 0,0-1-1,0 36 157,0 17-156,0 0-16,0 1 15,0-1 1,0 18-16,0-36 16,0 1-1</inkml:trace>
+  <inkml:trace contextRef="#ctx0" brushRef="#br0" timeOffset="27807.83">16545 6227 0,'-88'0'32,"70"0"-32,1 0 31,-1 0-16,1 0 1,-1 0-16,18 17 31,0 1-31,0-1 16,0 19-16,0-1 16,0-17-16,0 17 15,0 0-15,0 0 16,18 1-16,-1-1 15,1 0-15,-1 1 16,1-19-16,0 1 16,-1-18-16,19 0 15,-36 18-15,53-18 16,-1 17 0,-34-17-16,0 0 15,17 0-15,-17 0 16,17 0-16,-17 0 15,-1 0-15,1 0 16,0 0 0,-1 0-1,18-17-15,-17 17 16,0-18 0</inkml:trace>
+  <inkml:trace contextRef="#ctx0" brushRef="#br0" timeOffset="28671.42">17092 6227 0,'18'35'47,"-18"0"-47,0 36 15,17-18-15,-17-18 0,18 18 16,-18-36-1,0 36-15,0-35 16,18 17 0,-18-17-1,17 0 1,-17-54 125,18-17-141,0-17 15,-18 34-15,0-34 16,35-1-16,-35 36 15,17-18-15,1 18 16,-18 17-16,35-35 16,-35 36-16,18-1 15</inkml:trace>
+  <inkml:trace contextRef="#ctx0" brushRef="#br0" timeOffset="29383.5">17339 6244 0,'18'18'32,"-1"-18"-17,1 17-15,17 19 16,0-19-16,18 36 15,-53-35-15,53 0 16,-35 17-16,35 0 16,-35-17-16,-1-1 15,54 19-15,-36-1 16,0-17-16,-17-1 16,35 36-16,-18-53 15,-17 18 1,-1-18-16,19 35 15,-19-17 1</inkml:trace>
+  <inkml:trace contextRef="#ctx0" brushRef="#br0" timeOffset="33640.73">14340 3210 0,'0'-17'47,"18"34"-31,0 19-16,-1 16 15,1-16-15,-18-1 16,0 0-16,0 1 16,0 16-16,0 1 15,0 0-15,0-35 16,0 17-16,0 18 16,-35-18-1,35-52 126,17-1-141,54 1 15,-1-1-15,-17 18 16,-17 0-16,34 0 16,-35 0-16,18 0 15,-17 0-15,-1 0 16,0 0-16,0 35 16,18 0-16,-35-35 15,-18 36-15,18 17 16,17-18-1,-35 0-15,0-17 16,0-1-16,0 19 16,0-19-1,0 1 1,-35-18 0,-1 35-16,1-35 15,0 0-15,-18 0 16,-35 0-16,17 0 15,1 0-15,-54 0 16,54 0-16,-19-35 16,1 0-1,35 17-15,0 0 16,0 1 0,36 17-16,-1 0 15,1 0 1,-1 0-16,0 0 15,-17 0 1,17 0 0,18-18-16</inkml:trace>
+  <inkml:trace contextRef="#ctx0" brushRef="#br0" timeOffset="34646.97">14464 3069 0,'0'0'15,"35"0"-15,0 0 0,-17 0 16,17 0-16,1 0 16,34 0-16,-52 0 15,35 0-15,-36 0 16,36 0-16,-35 0 15,52 0-15,-52 0 16,35 18 0,-35-18-16,52 0 15,-17 0-15,-35 17 16,35-17-16,-36 0 16,1 0-1</inkml:trace>
+  <inkml:trace contextRef="#ctx0" brushRef="#br0" timeOffset="35655.46">15893 3157 0,'-18'53'63,"0"-35"-48,-35 52-15,18 1 16,18-18-16,-1 0 15,-17 17-15,35-17 16,-18 0-16,18 18 16,-35 35-16,35-71 15,0 0-15,0 36 16,0-36 0,0 0-16,17 1 15,19 17-15,17-1 16,-36-16-16,1-36 15,35 0-15,-18 35 16,0-35-16,-17 0 16,35 0-16,-18 0 15,18 0-15,0 0 16,-18 0-16,0 0 16,1 0-16,17-18 15,-18-35-15,-17 53 16,17-88-16,-17 53 15,-18-53-15,17 17 16,-17-35-16,0-17 16,0 35-16,0-1 15,0 1-15,0 71 16,-17-54-16,-1 53 16,-17-17-1,17 18-15,0 17 16,-17-18-16,17 18 15,1 0-15,-36 0 16,-18 0 0,54 0-16,-1 0 15,-17 0-15,-36 0 16,54 0-16,-54 0 16,18 0-16,18 0 15,0 0-15,-18 0 16,0 0-16,0 0 15,35 0-15,1 0 16,-36 0-16,35 18 16</inkml:trace>
+  <inkml:trace contextRef="#ctx0" brushRef="#br0" timeOffset="36718.62">17321 3351 0,'-88'0'32,"53"18"-32,0 17 15,17 1-15,-17 34 16,-1-35-16,1 18 16,-18 18-16,36-1 15,-1-17 1,-17 53-16,35-71 15,-18 36-15,18 17 16,0-35-16,0-35 16,0 35-16,0-18 15,0 18-15,35-18 16,18-17-16,-17 35 16,-1-53-16,-18 17 15,54-17-15,-18 0 16,-18 36-16,0-36 15,-17 0-15,35 0 16,-18 0-16,1 0 16,-1 0-16,18 0 15,-18-18 1,0 0-16,-17 1 16,0-71-16,-1 17 15,-17-17-15,36 0 16,-36-54-16,0 54 15,0-35-15,0 35 16,0 35 0,-18-53-16,0 71 15,-35-36-15,36 36 16,-19 17-16,19-17 16,-1 17-16,0 1 15,1 17-15,-1 0 16,1 0-16,-19 0 15,19 0 1,-19 0-16,19 0 16,-1 0-1,0 0-15,1 0 16,-1 0 0,-17 0-1</inkml:trace>
+  <inkml:trace contextRef="#ctx0" brushRef="#br0" timeOffset="37809.71">18256 3422 0,'-17'0'16,"-19"18"-16,19-1 15,-19 36-15,36 0 16,-35-18-16,18 36 15,17-18-15,-18 0 16,18 0-16,-35 17 16,35 1-16,0-36 15,0 36-15,0-36 16,0 0-16,17 0 16,19 1-16,-19-36 15,18 17-15,1 1 16,-1-18-16,-17 0 15,-1 0-15,54 35 16,-54-35-16,1 0 16,17 0-16,18 0 15,-17 0 1,-1 0-16,0 0 16,18-35-16,-18-18 15,18 18-15,-18-18 16,1-18-16,-19 18 15,1 18-15,-18-53 16,18 0 0,-18 17-16,0 18 0,0-35 15,0 17 1,0 54-16,-36-71 16,19 70-16,-19-17 15,19 17 1,-1 18-16,-17 0 15,17 0 1,1 0-16,-36 0 16,35 0-1,-17 0 1,17 0-16,1 0 16,-1 0-16,0 0 15,-35 0 1,18 0-1,17 0-15,-17 0 16,18 0-16,-19 0 16,19 0-16,-36 0 15,35 0 1,-35 0 0</inkml:trace>
+  <inkml:trace contextRef="#ctx0" brushRef="#br0" timeOffset="41840.92">14252 7867 0,'0'0'0,"0"176"0,0-35 16,0 53-16,0 36 16,0-89-16,0 18 15,0 17-15,0 0 16,0-87-16,0 16 16,0-34-16,0-36 15,0-17-15,0 0 16,0 17-16,0-18 15,0 1 79,0 0-94,0-1 16,0 19-1,0-19-15,0 19 16,18-19 62,17-17-62,-17 0-1,-1 0-15,36 0 16,0 0-16,53 0 16,35 0-16,36 0 15,17 0-15,-18 35 16,71 1-16,35-36 16,0 0-16,71 0 15,53 0-15,-106 0 16,-18 0-16,18 0 15,-36 0-15,-17 0 16,36 17-16,-1 1 16,-18 35-16,-52-35 15,0 17-15,-71-35 16,-35 0-16,-36 0 16,-35 0-16,-17 0 15,0 0 79,-1 0-94,1 0 16,0 0-16,17 0 15,0 0 1,18 0-1,-35 0-15,35-18 0,17 18 16,-34-35-16,34 17 16,-17-17-16,-35 35 15,35-18-15,-1-35 16,-52 36-16,18 17 16,17-35-16,-35-1 15,0-17-15,18-52 16,35-1-16,-35 0 15,-1-53-15,-17 18 16,0-53-16,0 53 16,0-88-16,0-1 15,0 36-15,0 0 16,-35 53-16,17-35 16,1 35-16,-1-71 15,18 124-15,0 0 16,0 35-16,-35-18 15,35 53 1,0 1 0,-18-1 109,-35 18-94,36 0-31,-36 0 16,0 18-16,0 17 15,-53-17-15,-35-1 16,0 36-16,-36-35 15,1-18-15,-53 35 16,-89 18-16,-105-18 16,88-35-16,17 0 15,-70 18-15,35-18 16,54 0-16,16 0 16,54 0-16,0 0 15,35 0 1,0 0-16,70 0 15,18 0-15,36 0 16,52 0-16,-52 0 16,17 0-16,-18 0 15,18 0-15,0 0 16,-35 0-16,35 0 16,-35 0-16,0 0 15,-36 0-15,71 0 16,-35 0-16,53 0 15,-18 0-15,0 0 16,18 0-16,-36 18 16,18 17-16,36-35 15,-1 0-15,0 0 16,1 18 15,17 34 0,0-34-15,0 17 0,0-17-1,53 17-15,17 18 16,-52-53-16,35 18 16,-18 17-16,-35-17 15,18-18-15,-1 17 16,1 1-16,-18 0 15,0 35-15,18 17 16,-1-35-16,1 54 16,0-54-16,-1 18 15,-17-18-15,0 36 16,0-36-16,0 0 16,0-17-16,0 0 15,0 34-15,0-34 16,-17-18-1,17 35 32,-18-35-31,0 0 31,1 0-47</inkml:trace>
+  <inkml:trace contextRef="#ctx0" brushRef="#br0" timeOffset="46183.31">14464 10636 0,'0'36'31,"0"16"-31,0 1 16,0 36-16,0 16 16,18 54-16,-1-35 15,1-19-15,-18 72 16,17-89-16,36 88 15,-53-52-15,18 17 16,0-53-16,-18 36 16,0-19-16,17-16 15,36 87-15,-53-88 16,18 0-16,-18-17 16,0-36-16,17 1 15,1 17-15,0-36 16,-1 18 124,-17-17-124,0 17-16,0-17 16,0 35-1,0-35-15,18-18 16,0 0 15,-1 0 0,1 0-15,17 0-16,0 0 16,1 0-16,52 0 15,35 35-15,89-35 16,17 0-16,89 0 16,-18 0-16,123 0 15,159 0-15,-123 0 16,123 0-16,-71 0 15,-105 0-15,0 0 16,-124 0-16,-53 0 16,-88 0-16,-17 0 15,-89 0-15,36 17 16,-54-17 0,19 18-1,-19-18 1,19 0-16,17 18 15,-36-18-15,54 17 16,-54 1-16,19 0 16,-19-18-16,19 0 15,-19 0 1,-17-36 93,0-52-109,0 18 16,0-54-16,-35-35 16,-36-17-16,1 35 15,-18-71-15,-1 1 16,36 69-16,18-34 15,35 88-15,0 0 16,0 70 0,0-35-16,0 18 0,-17 0 15,17-1 1,0 1-16,0 17 16,0-35-16,0 18 15,0 0-15,0 0 16,0-1-1,0 19-15,0-1 79,-18 0-64,18 1-15,0-1 16,0 0-16,0 1 15,-35-1 1,17 1 15,18-1-15,-18 18 0,-17-35-16,-18 17 31,36 0-31,-19-17 15,1 17-15,35 1 0,-35 17 16,-1-35 0,36 17-16,-17 18 172,-19 0-172,-52 0 15,-88 0-15,-89 0 16,36 0-16,-159 0 15,88 0-15,-88 0 16,-71 0-16,36 0 16,17 0-1,142 0-15,-1 0 0,106 0 16,36 0 0,17 0-16,-35 0 15,88 0-15,-35 0 16,53 0-16,-1 0 15,1 0-15,0 0 16,0 18-16,-1-18 16,1 17 77,17-17-77,-17 0 0,0 0-16,0 18 15,17-18 17,-35 0 46,35 0-78,-17 0 0,17 0 15,-52 35 1,35-35-16,35 18 16,-36-18-16,19 0 15,-1 0 1,0 0-1,1 0 1,-1 0-16,-17 0 31,17 0 32,1 0-48,-1 17 1,0-17 0,1 0-1,-19 0 17,19 0-32,-1 0 15,-17 0-15,17 0 31,-17 0-31,0 0 16,35 18-16,-18 0 16,0-18-16,1 0 31,-1 0-31,0 0 16,1 17-16,-1-17 15,-17 0 1,17 0-1,1 0 17,-1 18-17,0-18 1,1 0 0</inkml:trace>
+  <inkml:trace contextRef="#ctx0" brushRef="#br0" timeOffset="51815.43">5874 7549 0,'-18'0'32,"0"0"-32,-34 0 15,-1 18 1,0-18-1,-18 18-15,-17 17 16,17-17-16,-52-1 16,17-17-16,-17 18 15,-18 0-15,-89-1 16,19 36-16,-19-35 16,1 17-16,0 0 15,-1 18-15,72-53 16,-19 18-16,-17 35 15,18-18-15,-1 36 16,19-36-16,34-17 16,54 34-16,34-34 15,-34 35-15,52-35 16,0-1-16,1-17 16,-1 18-16,18 0 15,-17-18 1,17 52-1,0-34 1,0 53-16,0-54 16,17 54-16,18-18 15,18 17-15,53 19 16,-35-37 0,88 54-16,-36-53 15,1 18-15,17-36 16,70 36-16,-34-18 15,17-18-15,17 0 16,36 0-16,-70 18 16,87-53-16,-17 0 15,-17 0-15,16 0 16,-16 0-16,-36 0 16,35 0-16,-70 0 15,0-35-15,-18-18 16,-35 0-16,35 18 15,-88-18-15,17 0 16,1 0-16,35-35 16,-1 35-16,-16 0 15,-19 0-15,18-35 16,-52 53-16,69-36 16,-87 53-16,35-34 15,-35 34-15,17-17 16,-17 17-16,-1-17 15,1-1-15,17 1 16,-35 18 0,18-19-16,17-34 15,-35-1 1,0 36-16,0-18 16,0 0-16,-18-35 15,-70 0-15,0 35 16,17-18-16,-87-17 15,52 35-15,18 18 16,-1 0-16,-16 17 16,-19-17-16,36 35 15,35 0-15,-35 0 16,0 0-16,-1 0 16,1 0-16,0 0 15,-53 0-15,53 0 16,-18 0-16,18 0 15,17 0-15,-17 0 16,70 0-16,-35 0 16,36 0-16,-1 0 15,1 0-15</inkml:trace>
+  <inkml:trace contextRef="#ctx0" brushRef="#br0" timeOffset="52983.89">7602 8096 0,'0'0'0,"18"106"31,-18-53-31,0 35 0,0 0 16,0 1-16,0 52 15,0 35-15,0-70 16,0 17-16,0 19 16,0 16-16,0 19 15,0-36-15,0 53 16,-35 17-16,17-52 16,0 18-16,-17 52 15,0 0-15,0-35 16,-1 36-16,-17 34 15,36-87-15,-19-1 16,1 0-16,0-35 16,-18 0-16,18-17 15,17-1-15,0 1 16,1 17-16,17-17 16,-35-36-16,-1 53 15,19 35-15,17-35 16,-18 0-1,-17 18-15,-1 18 16,36-72-16,0-34 16,0-53-16,0 17 15</inkml:trace>
+  <inkml:trace contextRef="#ctx0" brushRef="#br0" timeOffset="54641.06">2117 8819 0,'0'0'16,"-36"159"-16,19 53 0,17-53 15,-18 52 1,-35 19-16,36-36 0,-1-53 16,0 35-16,-35 1 15,36 17-15,-1-18 16,18 0-1,-70 18-15,70 18 16,0-18-16,0 0 16,0 0-16,0-18 15,0-34-15,0-1 16,0-35-16,0-36 16,0-17-16,0 0 15,0 17-15,0-17 16,0 0-16,0 18 15,0-1-15,0 1 16,0 0-16,17-19 16,-17-16-16,18 34 15,-1-34-15,1-1 16,0 0 0,17 18-1,-17-35 1,-1-1-1,1 1 1,0 0-16,17-18 16,-18 0-1,1 17 1,0-17 0,17 35-1,-17-35-15,17 0 16,0 0-16,0 18 15,18 0-15,-17-18 16,34 35-16,54-17 16,-36-1-16,35 54 15,19-71-15,69 35 16,-52-35-16,105 71 16,-34-36-16,-1-17 15,18-1-15,35-17 16,-17 53-16,-71-53 15,141 35 1,-211 1-16,-1-1 16,-35-17-16,0-18 15,-17 17-15,-1 1 16,19 17-16,-54-35 16,53 18-16,-35-18 15,35 0-15,-17 0 16,-1 18-16,36-1 15,-53-17-15,-18 0 16,1 35 0,-19-35-1,1 0 95,-18-17-110</inkml:trace>
+  <inkml:trace contextRef="#ctx0" brushRef="#br0" timeOffset="57080.5">2434 6262 0,'0'0'0,"0"159"0,0 17 16,0-70-16,0 70 15,0-52-15,0-54 16,0-17-16,0 0 15,0-18-15,0-17 16,0-89 78,0-140-94,0-36 15,0 53-15,0 53 16,0 52-16,0 37 16,0 34-16,0 0 47,18 18-32,-1 0 1,1 0-16,35 0 15,-18 0-15,71 106 16,-53 18-16,35-36 16,-17 53-16,-36-88 15,18 35 1,-18-17-16,-17-54 16,0-17 15,-1 0-16,54-70-15,-54-36 16,-17-18-16,18-70 16,35-17-16,-53 69 15,0-16-15,0 17 16,0 52-16,0 37 16,0 34-16,0-17 15,0 17 16,0 89 79,18 17-110,-1-18 15,1 54 1,35-1-16,-53-35 16,17 54-16,1-54 15,35 35-15,-53-35 16,18 1-16,-1 34 16,-17-52-16,18-36 15,-18-17-15,0-1 16,17 1-1</inkml:trace>
+  <inkml:trace contextRef="#ctx0" brushRef="#br0" timeOffset="57945.86">3757 6403 0,'-18'18'16,"18"-1"-1,-35 36-15,35-35 16,0 17-16,0-17 0,0-1 16,0 36-16,0-17 15,0-1 1,0-18-16,0 1 16,0 17-16,35-17 15,18 17 1,0-17-16,0 0 15,-35-18 1,35 0-16,-36 0 16,1 0-16,35 0 15,0 0-15,17-18 16,-52-17-16,17-18 16,-17 35-16,35-52 15,-35-19-15,-18 36 16,17 0-16,-17 18 15,0 0-15,0 17 16,0 1-16,0-1 16,-17 18-1,-1 0 1,-17 0-16,-1 0 16,1 0-16,0 0 15,0 0-15,-18 0 16,17 0-1,1 0-15,-18 0 16,35 0-16,-17 0 16,35 18-16</inkml:trace>
+  <inkml:trace contextRef="#ctx0" brushRef="#br0" timeOffset="58520.49">4798 6597 0,'0'0'0,"0"53"0,0 106 16,0-124-1,0-17 1,0-1-16,0-52 109,0-18-93,0 18-16,0-1 16,0 1-16</inkml:trace>
+  <inkml:trace contextRef="#ctx0" brushRef="#br0" timeOffset="58887">4957 6491 0,'35'-18'16,"-18"18"0,1 0-16,0 0 15,-1 0-15,19 0 16,-19 0 0,1 0-1,35 18-15,-36-18 16,-17 53-16,18-35 15,0 35-15,-18-36 16,0 54-16,0-18 16,0-36-1,0 1-15</inkml:trace>
+  <inkml:trace contextRef="#ctx0" brushRef="#br0" timeOffset="59591.51">5556 6632 0,'0'0'0,"-35"36"0,17-19 16,1 36-1,-1-35-15,18-1 16,0 1 0,0 0-1,0-1-15,0 19 16,18-1 0,-1-35-1,19 0-15,17 0 16,-36 17-16,18-17 15,-17 0-15,53 0 32,-36 0-17,0 0 1,-17 0-16,17-17 16,-17-18-16,35-36 15,-53 18-15,17 35 16,-17-70-16</inkml:trace>
+  <inkml:trace contextRef="#ctx0" brushRef="#br0" timeOffset="60087.49">5944 6579 0,'0'36'0,"0"-72"0,0 19 16,0 34 77,-17 72-77,-1 16-16,18-34 16,-18 35-16,18-53 15,-35 17-15,35 1 16,-18-18-16,1 17 16,17-17-16,-18-35 15,1 17-15,-1 0 16,0-17-16,1 17 15,-1-17 1,0-18-16,-17 0 16,-18 0-16,0 18 15,-17-18-15,-1 0 16,-17 0-16,0 0 16,-18 0-16,18 0 15,35 0-15,35 0 16,1 0-16,-1 0 15</inkml:trace>
+  <inkml:trace contextRef="#ctx0" brushRef="#br0" timeOffset="60993.23">6315 6350 0,'0'0'0,"0"18"0,-36-1 16,36 1-16,0 17 15,-17-17-15,-1-1 16,1 36-16,-1-17 15,18-1-15,-18 0 16,18 18-16,0-35 16,0 35-16,0-36 15,0 54-15,0-53 16,0-1-16,0 18 16,18-17-1,17-18-15,0 0 16,1 0-16,17 35 15,-18-35-15,-17 0 16,17 0-16,-18 0 16,1 0-16,17 0 15,1 0-15,-19 0 16,36-35-16,-35 0 16,35-18-16,-18 0 15,-35-18 1,53-17-16,-53 35 0,0 18 15,0-36 1,0 54-16,0-18 16,0 17-16,0-17 15,0 17-15,-18 18 16,1 0 0,-19 0-16,-16 0 15,-1 0 1,35 0-1,0 0-15,1 0 16</inkml:trace>
+  <inkml:trace contextRef="#ctx0" brushRef="#br0" timeOffset="65063.11">12718 16757 0,'-18'53'15,"18"88"-15,0 0 16,0 53-16,0-106 15,0 53-15,0 1 16,0-19-16,0-35 16,0-35-16,0-18 15,-18-17-15,54-18 172,17 0-172,52-53 16,-16 53-1,-19-18-15,18 18 16,-17-17-16,-18 17 16,-18 0-16,0 0 15,-17 0-15,0 0 16</inkml:trace>
+  <inkml:trace contextRef="#ctx0" brushRef="#br0" timeOffset="66023.45">13564 17392 0,'0'0'0,"-17"0"0,-1 35 0,0-35 16,18 53-16,-17-18 16,17 18-16,0-17 15,0-1 1,0 35-16,0-52 16,17 35-16,1-18 15,0-35-15,-1 18 16,19 17-16,16-35 15,-34 0 1,17 0-16,-17 0 16,0 0-1,-1 0-15,19 0 16,-19 0-16,-17-17 16,53-1-16,-53-17 15,18-1-15,-18 19 16,0-19-16,35-16 15,-17 34-15,-18-17 16,0 17 0,0-17-16,0 17 15,0 0-15,-18 18 16,-17-17 0,0-19-16,-1 19 15,1 17-15,-18-18 16,-53-52-1,53 52-15,18 18 16,17 0-16,1 0 16,-1 0-16,0 0 62</inkml:trace>
+  <inkml:trace contextRef="#ctx0" brushRef="#br0" timeOffset="66839.56">14305 17339 0,'-35'0'0,"17"0"16,-35 0-16,36 18 16,-54-1-16,1 36 15,17-35-15,0-1 16,35 1-16,-35-18 15,36 18 1,17-1 0,0 1-16,0 17 0,0-17 15,0 17 1,0-17-16,17-18 16,54 0-16,-54 0 15,54 18-15,-18-18 16,0 0-16,0 0 15,0 0-15,-18 0 16,0 0-16,0 0 16,1 0-16,-19 0 15,19 0-15,-1 0 16,-17 0-16,-1 0 16,1 0-16,-1 0 15,19 0 1,-19 0-1,1 0 1,0 0-16,-1 0 16,1 0-16,17 0 15</inkml:trace>
+  <inkml:trace contextRef="#ctx0" brushRef="#br0" timeOffset="67968.8">14993 17374 0,'0'0'0,"-35"0"0,-18 0 16,0 0-16,35 0 16,1 0-16,-19 0 15,19 0-15,-1 0 16,0 0-16,1 0 62,17 36-46,0-19 0,0 18-16,0-17 15,17 35-15,19 18 16,-19-71-16,36 53 16,-35-36-16,52 1 15,-34-18 1,-19 0-16,1 0 15,0 0 1,17 0 15,-17 0-15,-1-35 0,-17-1-16,0 1 15,0 0-15,0 17 16,0 0-16,18-17 15,-18 17-15,18 18 141,-18 71-125,0-18-16,17 18 15,-17-1-15,0-35 16,18 36-16,-18-53 16,0-1-16,0-34 140,17-19-124,1 19-16</inkml:trace>
+  <inkml:trace contextRef="#ctx0" brushRef="#br0" timeOffset="68624.34">15346 16528 0,'17'-18'16,"36"36"0,-35 35-16,0 35 15,17 0-15,-17 0 16,-1 36-16,1-1 15,-18-17-15,18 35 16,-18-18-16,0-17 16,0-17-16,0-1 15,0-35-15,0-36 16,0 19-16</inkml:trace>
+  <inkml:trace contextRef="#ctx0" brushRef="#br0" timeOffset="71519.83">28557 8502 0,'-53'0'46,"-17"0"-46,-18 18 16,-18-1-16,0 36 16,-35-35-16,0-1 15,-36 1 1,-17-18-16,18 53 16,0-35-16,-1-1 15,54 1-15,-18 0 16,-36 17-16,-17-35 15,18 17-15,-18-17 16,0 0-16,0 0 16,0 0-16,-71 0 15,18 0-15,-53 0 16,-17 0-16,17 0 16,35 0-16,-17 0 15,18 0-15,-1 0 16,71 0-16,0 0 15,18 0-15,34 0 16,54 0-16,53 0 16,-18 0-16,35 0 15,-17 0-15,18 0 16,-36 0 0,17 0-1,1 0-15,0 0 16,-18 0-1,0 0-15,0 0 16,-18 0-16,-17 0 16,-53 0-16,53 0 15,-18 0-15,18 0 16,0 0-16,0 0 16,-1 0-16,19 0 15,17 0-15,-53 0 16,35 0-16,-34 0 15,52 0-15,0 0 16,35 0-16,-17 0 16,17 0-16,1 0 15,-1 0 17</inkml:trace>
+  <inkml:trace contextRef="#ctx0" brushRef="#br0" timeOffset="73718.57">19279 7708 0,'0'18'32,"0"52"-17,-17 36-15,17-18 16,-36-17-1,36 17-15,-17 0 16,-1 36-16,0-71 16,1 35-16,-1-70 15,18 17-15,0-18 16,0 1 62,-53-53-62,18-36-16,0-17 15,-1 18-15,19-1 16,-1 36-16,18-18 16,0-18-16,0 36 15,0-36-15,0 19 16,0-19-16,0 18 15,0 18-15,0 17 16,0 0-16,0 1 16,18-18-16,-1-1 15,1 1-15,-18 17 16,35-35-16,1 18 16,-36 18-1,53-19-15,-36 19 16,18-1-16,-17 18 15,17 0 1,-17 0-16,0 0 16,35 0-16,0 0 15,-36 0 1,36 0-16,-53 18 16,35 17-16,1 0 15,-19-17 1,-17-1 31,0 1-32,0 0-15,0-1 16,0 1 0,-17 17-16,-19 1 15,-34 34-15,52-52 16,-52 35-16,17-36 15,0 1-15,17 0 32,1-18-32,0 0 0,17 17 15,1-17 1,-1 0 0,-17 0-1,17 0 1</inkml:trace>
+  <inkml:trace contextRef="#ctx0" brushRef="#br0" timeOffset="75031.56">19773 8590 0,'0'0'0,"-17"0"15,-36 18-15,17 17 16,1-35 0,0 35-1,0-17 1,17 0-16,18-1 16,0 19-1,0-19-15,0 36 16,0-35-16,0 17 15,0-17-15,0 17 16,0 0-16,0 0 16,18 1-1,17-19-15,-18 1 16,19 0-16,-19-18 16,1 0-1,0 0-15,-1 0 31,19 0-31,-19 17 47,1-17 0,-18-35 0,0 17-31,0 1-1,0-1-15,0 0 16,0 1 15,-18 17-31,1 0 31,-19 0-15,1 0 0,0 0-1,17 0 1,-17 0-16,17 0 16,1 0-16,-36 0 15,35 0 1,18 17-16</inkml:trace>
+  <inkml:trace contextRef="#ctx0" brushRef="#br0" timeOffset="81447.48">16757 9102 0,'18'0'16,"17"17"-16,0 36 15,-35 18-15,18-36 16,-18 53-16,17-35 16,-17-35-16,0 17 15,0-17 1,0-1-16,0-34 94,-52-54-94,-19-35 15,18 36-15,-18-18 16,19-1-16,34 72 16,-17-36-16,17 0 15,0 53-15,18-18 47,0 1 0,18-19-31,0 36-16,-1 0 15,1 0-15,35 0 16,-36 0-1,1 0 1,0 0-16,17 0 16,-17 0-16,-1 0 15,1 0 1,0 0 0,-1 0-1,1 0-15,0 0 16,-18 18-1,0 0 1,0 17 0,-36 0-1,36-17-15,-17-1 16,-1-17 0,18 18-16,-35-18 15,-1 0 1,19 0-16,-1 0 15,0 0-15,1 0 16,-1 0 0,-17 0-16,17 0 47</inkml:trace>
+  <inkml:trace contextRef="#ctx0" brushRef="#br0" timeOffset="82351.48">17039 9172 0,'-17'53'31,"-1"-35"-31,0 35 16,18-18-16,-17-17 15,17 35-15,0-36 16,0 36-16,0-18 15,0 1-15,0-19 16,0 19 0,17-36-1,1 0 1,0 0-16,-1 0 16,18 0-16,-17 0 15,0 0-15,35 0 16,-36-18-16,19 0 15,-1-17-15,-18 0 16,1 17-16,0 18 16,-1-53-16,-17 36 15,0-1 1,0 0 0,0 1-16,0-1 31,-17 0-16,-19 1 1,19 17 0,-1 0-1,-17 0 1,17 0 0,1-18-16,-1 18 15,0 0 1</inkml:trace>
+  <inkml:trace contextRef="#ctx0" brushRef="#br0" timeOffset="83430.81">17445 9225 0,'17'0'46,"-17"18"-14,18-18 93,-18 17-110,18-17-15,-1 0 16,1 36-16,0-36 16,-1 0-1,54 0 1,-53 17-1,-1 1 17,1-18 15,-18 18-32,0-1-15,0 1 16,0 0-16,0-1 15,0 1 1,-18-1-16,18 1 16,-17 0-1,-1-18-15,0 17 16,-17-17 0,17 0-16,-17 0 15,0 0-15,-18 0 16,-18 0-16,-17 0 15,70 0-15,-34 0 16,34 0-16,0 0 16</inkml:trace>
+  <inkml:trace contextRef="#ctx0" brushRef="#br0" timeOffset="84144.78">17709 8837 0,'0'0'0,"36"0"16,17 124 0,-36-107-1,19 54-15,-36-1 16,17-52-16,-17 35 15,0 0-15,18-18 16,-18 0-16,0 18 16,0-35-16,0 17 15,0-17 1</inkml:trace>
+  <inkml:trace contextRef="#ctx0" brushRef="#br0" timeOffset="84673.03">17709 9084 0,'18'0'62,"0"0"-46,17 0-16,-17 0 15,17 0 17,-17 0 30,-1 0-46</inkml:trace>
+  <inkml:trace contextRef="#ctx0" brushRef="#br0" timeOffset="87040">17022 9084 0,'-36'0'47,"19"0"-32,-19 0-15,19 0 16,-36 0-16,18 0 15,-18 0-15,-36 0 16,-16 0-16,-19-53 16,-52 35-16,52 1 15,-52-36-15,35 35 16,-53 18-16,35-35 16,-70-18-16,35 35 15,70 1-15,-35 17 16,36-18-16,-1 1 15,-17-19-15,0 36 16,-35 0-16,35 0 16,35 0-16,-35 0 15,-18 0-15,-35 36 16,-35-19-16,-18 36 16,-18-18-16,-35-35 15,71 36-15,0-1 16,-36 18-16,71-53 15,-18 70-15,71-70 16,-35 18-16,141 0 16,-36-1-16,1 19 15,34-19 1,-17-17-16,0 18 16,18 0-16,-88 34 15,17-34-15,-35 70 16,53-52-16,-18 34 15,-53 18-15,18-35 16,-18 18-16,18-18 16,-18 17-16,71-17 15,-35 0-15,34-35 16,-16 35-16,16-18 16,-52 35-16,53-34 15,-18 17-15,-70 17 16,35 1-16,17-36 15,1 18-15,17 35 16,-18 18-16,-17-18 16,53-35-16,-71 71 15,54-54-15,-1 36 16,0 0-16,18-18 16,-18-17-16,0 17 15,35-35-15,-34 35 16,52-53-16,53 18 15,-18-35 1,0-1 0,36-17 124,0 0-124</inkml:trace>
+  <inkml:trace contextRef="#ctx0" brushRef="#br0" timeOffset="88918.98">18909 7779 0,'-18'0'78,"-35"0"-78,-35 0 15,0 0-15,-88 0 16,17 0-16,-18 0 16,1 0-16,-36 0 15,-17-53-15,0 53 16,-36-53-16,18 35 16,-17-52-1,-19 52-15,-16-17 16,-72-36-16,1 54 15,17 17-15,53 0 16,-17-89-16,-1 89 16,18 0-16,36-17 15,-19 17-15,72-18 16,34 18-16,-17 0 16,53 0-16,53 0 15,17 0-15,1 0 16,35 0-16,-1 0 15,-34 0-15,-18 0 16,-1 0-16,-87 0 16,0 0-16,-36 0 15,-17 0-15,-71 0 16,35 0-16,36 0 16,17 0-16,36 0 15,-18 18-15,70-18 16,1 17-16,17 1 15,36-18-15,-19 18 16,1-18-16,18 35 16,34-35-16,-52 18 15,0-18 1,0 17-16,-18 1 16,53-18-16,-71 53 15,107-53-15,-71 17 16,17 1-16,18-18 15,-17 35-15,-36-17 16,53 0-16,18 17 16,-18 0-16,53-17 15,-36-18-15,19 0 16,-1 17-16,0 1 16,-17 17-1,0 1-15,17-19 16,-35 36-1,18-35-15,35 0 0,-53 17 16,36-18-16,-1 1 16,0-18 15,18 18-31,-17-18 47</inkml:trace>
+  <inkml:trace contextRef="#ctx0" brushRef="#br0" timeOffset="91038.65">19579 9208 0,'0'17'16,"0"36"0,-17-18-1,17-17-15,0 17 16,-18 18-16,0-35 15,-17 17-15,0 18 16,-1-18-16,-52 53 16,-18 18-16,18-35 15,-106 52-15,18-34 16,-1 16-16,-34 19 16,-54-1-1,1-17-15,-72 35 16,72-35-16,-36 35 15,-229 18-15,17 0 16,-70 17-16,18-52 16,35 52-16,35-88 15,106-35-15,141 0 16,17-53-16,1 71 16,35-54-16,18 1 15,35-18-15,17 17 16,1 19-16,-18-1 15,-36-17-15,1-1 16,-18 36-16,17-35 16,1-18-16,-18 17 15,53 1-15,-36 53 16,19-54-16,-19 54 16,-17-18-16,-17-36 15,-19 54-15,36-36 16,18 18-16,35-18 15,35-17-15,0 0 16,0 35-16,71-53 16,-53 17-16,52-17 15,-34 0 1,17 0 0,0 0-16,0 0 15,0 0-15,-35 0 16,0 0-16,0 0 15,-18 0-15,-71 0 16,36 0-16,0 0 16,53 0-16,-35 0 15,70 0-15,0 0 16,-35 0-16,-1-35 16,36 35-16,36 0 15,-18 0-15,17 0 16,0 0 15,-17 0-15,17 0-16,-17 0 15,0 0-15,-1-18 16,1 18-16,0 0 16,17-17-16,1 17 15</inkml:trace>
+  <inkml:trace contextRef="#ctx0" brushRef="#br0" timeOffset="93201.59">6473 10866 0,'0'35'15,"0"-18"-15,0 54 16,0 0-16,0-1 15,0-17-15,0 35 16,0 0-16,-17 1 16,17-19-16,0-35 15,0-17-15,0 0 16,-18-1-16,36-17 234,52 0-218,19 0-16,-1 0 16,18 0-16,17 0 15,300-35 1,-352 17-1,17 18-15,-53 0 16,-17-17 0,-36 17 124,1 0-140,-1 0 16,1 0 0,-1 0-16,0 0 15</inkml:trace>
+  <inkml:trace contextRef="#ctx0" brushRef="#br0" timeOffset="94704.57">16528 8608 0,'0'17'15,"0"1"1,17 0-16,1-1 31,0 1-31,-18 0 16,35 17-16,-18-35 15,1 35-15,0-17 16,-1-1-16,1 19 16,0-19-16,-18 1 15,0 0-15,17-1 16,-17 19 0,0-19-1,0 1-15,0-1 16,0 1-16,0 0 15,0 17 1,-17-35-16,17 35 31,-36-35-15,19 0 0,-1 0-1,-17 18-15,35 0 16,-35-1-1,17-17-15,-17 18 16,17-18-16,-35 35 16,35-17-1,1-18 1,-1 0-16,1 0 31,-19 0-15,19 0-1,-1 0 1,0 0 0</inkml:trace>
+  <inkml:trace contextRef="#ctx0" brushRef="#br0" timeOffset="96192.99">20302 8643 0,'0'0'0,"-70"88"15,35-52 1,17-19-16,0 18 16,-35 18-16,53-35 15,-17 0 1,-1-1-16,18 1 31,-35 0-15,17-18-1,0 0 1,1 0-16,-1 0 16,53 0 124,18 0-140,18 35 16,17-18-16,-35 1 15,35 0-15,-52 17 16,-19-35-16,36 0 16,-35 18-16,-1-18 15,19 0-15,-72 0 141,19 0-125,-19 0-1</inkml:trace>
+  <inkml:trace contextRef="#ctx0" brushRef="#br0" timeOffset="97847.56">28452 8096 0,'0'18'0,"0"17"15,0 0-15,0-17 16,17 17-16,18 1 15,-17-1-15,0-17 16,-18-1-16,35 1 16,-17-1-1,-18 1-15,35-18 0,-17 18 16,17-1 0,-18 1-16,1 0 15,0-18 1,-1 0-16,1 0 31,17 35-15,-35 0 62,-88 0-78,18-17 15,-1 0-15,-17-1 16,-36 19-16,36-1 16,-35 36-16,70-36 15,0-18-15,18 1 16,17 0-16</inkml:trace>
+  <inkml:trace contextRef="#ctx0" brushRef="#br0" timeOffset="123830.46">12965 7391 0,'0'0'0,"-18"0"0,-35 0 16,-18 0-16,19 0 16,-1 0-16,-71-53 15,1 35-15,-1 18 16,-70-35-16,-70-71 15,-72 18-15,-16-36 16,17 54-16,-36-71 16,-52-36-16,105 1 15,1 52-15,-1-34 16,107 34-16,-1 18 16,36-17-16,17 17 15,0 0-15,36-35 16,-18 35-16,-18-35 15,0-35-15,0-36 16,18-17-16,0 70 16,-35-35-16,35 71 15,35 17 1,-18 0-16,36 18 16,17 17-16,36 36 15,-18-36-15,36 54 16,-1-36-16</inkml:trace>
+  <inkml:trace contextRef="#ctx0" brushRef="#br0" timeOffset="124415.99">5856 2646 0,'0'0'0,"-18"53"0,1 123 31,-18-70-31,17 17 0,18-17 16,-53 194 0,53-212-1,0 1-15,0-37 16,0-34-16,0 0 15,0-1 1,0-87 78,0-18-94,0-18 15,0-18-15,0-17 16,0-35-16,0 35 16,0-18-16,0-17 15,0-1-15,0 71 16</inkml:trace>
+  <inkml:trace contextRef="#ctx0" brushRef="#br0" timeOffset="125081.58">5803 2099 0,'0'0'0,"124"18"31,-54 17-31,54 71 0,-36-36 16,35 54-16,-17-36 15,18 35-15,-18-70 16,-54 0-16,1 0 15,-35-53-15,17 36 16,-17-19-16,0 1 31,17 17-31,-35-17 16,17-1-16,-17 19 16,0-1-16,18-17 15,-18 17-15,18 35 16,-18-52-16,0 53 15,0-36-15,0 0 16,0 18-16,0-18 16,0 18-16,0-35 15,-18 70-15,-17-35 16,17-18-16,-17 18 16,0 18-16,35-54 15,-18 1 1,-17 17-16,17-17 15,18 0 1,-18-18-16,1 0 16,-36 0-16,0 0 15,18 0-15,17 0 16,-17 0-16,-1 0 16,-16 0-1,34 0 1,0 0-1,1 0 1,-1 0 62</inkml:trace>
+  <inkml:trace contextRef="#ctx0" brushRef="#br0" timeOffset="127878.65">3457 1588 0,'0'0'0,"-88"70"15,0-35-15,-18 1 16,35-1-16,1 18 15,-18-18-15,52-17 16,-16 17-16,16 0 16,1-35-16,0 18 15,17 17-15,-17-35 16,35 18-16,-18-18 16,-17 35-16,17-17 15,18 17 1,0-17-16,0 17 15,0 0-15,0 53 16,18-52-16,-1-1 16,72 36-16,-54-19 15,18-16-15,17-1 16,-52-35-16,17 18 16,-17-18-16,17 0 15,-17 0-15,17 0 16,-17 0-1,35 0 1,-18 0-16,53 0 16,-53-36-16,18 36 15,-35-17-15,-18 34 94,-18 19-94,-52 34 16,17 1-16,18 35 15,-18-36-15,17 18 16,-34 53-16,52-88 16,1 18-16,17-1 15,0-34-15,0 52 16,0-18-16,0 1 15,0-53-15,0 17 16,17 18-16,19-18 16,16 0-16,-34-35 15,35 36 1,18-19-16,-36-17 0,53 18 16,0-18-1,53 0-15,-17 0 16,17 0-16,0 0 15,-35 0-15,-36 0 16,-34-18-16,-1 1 16,0-1-16,1 0 15,-36 1-15,17 17 47,1 0-31,17 0-16,0 0 15,18 17 1,0 1-16,18 35 16,-18-35-16,17-1 15,1 19-15,17-1 16,0-18-16,36 19 16,17-36-16,18 17 15,-18-17-15,-36 0 16,72 0-16,-71 0 15,-1-17-15,19-19 16,-53-16-16,-19-19 16,-16 36-16,-36-53 15,0 17 1,0 0-16,0-17 16,0 35-16,0 36 15,-18-19-15,0 1 16,18 53 93,18-18-78,0 0-15,17 0-16,-17 0 16,-1-18-16,19-17 15,-1-53-15,-35 52 16,0-52-16,0 18 16,0-1-1,0 18-15,0-17 0,0-1 16,-53-35-1,0 53-15,0 0 16,-53-52-16,18 52 16,-53 0-16,17-18 15,1 36-15,17-18 16,-53 35-16,71 1 16,18 17-16,52 0 15,53 0 48,1 0-63,34 0 15,1 0-15,17 17 16,-35-17-16,0 0 16,35 0-16,-35 0 15,35 0-15,-35 0 16,-18 0-16,36-17 15,-18-36-15,0 17 16,17-52-16,-52 53 16,-1-36-16,-17-34 15,0 34-15,0-35 16,0-17-16,-52 35 16,-1-18-1,-53-53-15,18 71 16,-18-18-16,0 18 15,-18 0-15,36 35 16,18 17-16,-89-52 16,0 53-16,53 0 15,1-1-15,-37 1 16,19 35-16,17-18 16,0-17-16,0 35 15,36 0-15,-18 0 16,35 0-16,-35 0 15,17 0-15,53 0 16,-52 0-16,-18 18 16,52-18-16,19 35 15,-54 0-15,18-17 16,-17 35-16,-1-18 16,1 18-16,17-18 15,-18 18-15,53-35 16,-34 35-16,-1-18 15,17 18-15,19-35 16,-36 52 0,35-52-16,1-1 15,17 1-15,0 0 0,-36 17 32,36-17-32,0-1 15,-17 19-15,-1-19 16,18 36-16,0 53 15,0-18-15,0 36 16,0 17-16,0-35 16,71 52-16,-54-87 15,54 17-15,-36 18 16,-17-106-16,-18 35 16,17-35-16</inkml:trace>
 </inkml:ink>
 </file>
 
@@ -485,7 +580,7 @@
             <a:fld id="{DA87C823-BB9F-45DA-99AB-416A32E1B948}" type="datetime1">
               <a:rPr lang="es-ES" noProof="0" smtClean="0"/>
               <a:pPr/>
-              <a:t>01/11/2022</a:t>
+              <a:t>03/11/2022</a:t>
             </a:fld>
             <a:endParaRPr lang="es-ES" noProof="0" dirty="0"/>
           </a:p>
@@ -1001,7 +1096,7 @@
             <a:fld id="{35C83AD5-F5AF-4BDC-901E-85A05CCFFAAA}" type="datetime1">
               <a:rPr lang="es-ES" noProof="0" smtClean="0"/>
               <a:pPr/>
-              <a:t>01/11/2022</a:t>
+              <a:t>03/11/2022</a:t>
             </a:fld>
             <a:endParaRPr lang="es-ES" noProof="0" dirty="0"/>
           </a:p>
@@ -1266,7 +1361,7 @@
             <a:fld id="{40A1DB83-C382-4684-8887-65A03EA4FFF0}" type="datetime1">
               <a:rPr lang="es-ES" noProof="0" smtClean="0"/>
               <a:pPr/>
-              <a:t>01/11/2022</a:t>
+              <a:t>03/11/2022</a:t>
             </a:fld>
             <a:endParaRPr lang="es-ES" noProof="0" dirty="0"/>
           </a:p>
@@ -1516,7 +1611,7 @@
             <a:fld id="{C60E81D3-9B82-44CA-B1F9-FCEFDC87935B}" type="datetime1">
               <a:rPr lang="es-ES" noProof="0" smtClean="0"/>
               <a:pPr/>
-              <a:t>01/11/2022</a:t>
+              <a:t>03/11/2022</a:t>
             </a:fld>
             <a:endParaRPr lang="es-ES" noProof="0" dirty="0"/>
           </a:p>
@@ -1771,7 +1866,7 @@
             <a:fld id="{35C83AD5-F5AF-4BDC-901E-85A05CCFFAAA}" type="datetime1">
               <a:rPr lang="es-ES" noProof="0" smtClean="0"/>
               <a:pPr/>
-              <a:t>01/11/2022</a:t>
+              <a:t>03/11/2022</a:t>
             </a:fld>
             <a:endParaRPr lang="es-ES" noProof="0" dirty="0"/>
           </a:p>
@@ -2081,7 +2176,7 @@
             <a:fld id="{AA1D35CA-82F5-4AD4-B9EC-66E805B73542}" type="datetime1">
               <a:rPr lang="es-ES" noProof="0" smtClean="0"/>
               <a:pPr/>
-              <a:t>01/11/2022</a:t>
+              <a:t>03/11/2022</a:t>
             </a:fld>
             <a:endParaRPr lang="es-ES" noProof="0" dirty="0"/>
           </a:p>
@@ -2398,7 +2493,7 @@
             <a:fld id="{834CCE92-710B-4678-B1B1-EFCAA5CDF075}" type="datetime1">
               <a:rPr lang="es-ES" noProof="0" smtClean="0"/>
               <a:pPr/>
-              <a:t>01/11/2022</a:t>
+              <a:t>03/11/2022</a:t>
             </a:fld>
             <a:endParaRPr lang="es-ES" noProof="0" dirty="0"/>
           </a:p>
@@ -2835,7 +2930,7 @@
             <a:fld id="{83FB0F2C-25D9-4D7E-B43A-29A2E16C960D}" type="datetime1">
               <a:rPr lang="es-ES" noProof="0" smtClean="0"/>
               <a:pPr/>
-              <a:t>01/11/2022</a:t>
+              <a:t>03/11/2022</a:t>
             </a:fld>
             <a:endParaRPr lang="es-ES" noProof="0" dirty="0"/>
           </a:p>
@@ -3012,7 +3107,7 @@
             <a:fld id="{FD34687D-B11B-47A5-95F6-B79DA932A6DF}" type="datetime1">
               <a:rPr lang="es-ES" noProof="0" smtClean="0"/>
               <a:pPr/>
-              <a:t>01/11/2022</a:t>
+              <a:t>03/11/2022</a:t>
             </a:fld>
             <a:endParaRPr lang="es-ES" noProof="0" dirty="0"/>
           </a:p>
@@ -3122,7 +3217,7 @@
             <a:fld id="{93C656DE-1E46-4450-9484-A739B4FADFBC}" type="datetime1">
               <a:rPr lang="es-ES" noProof="0" smtClean="0"/>
               <a:pPr/>
-              <a:t>01/11/2022</a:t>
+              <a:t>03/11/2022</a:t>
             </a:fld>
             <a:endParaRPr lang="es-ES" noProof="0" dirty="0"/>
           </a:p>
@@ -3515,7 +3610,7 @@
             <a:fld id="{35C83AD5-F5AF-4BDC-901E-85A05CCFFAAA}" type="datetime1">
               <a:rPr lang="es-ES" noProof="0" smtClean="0"/>
               <a:pPr/>
-              <a:t>01/11/2022</a:t>
+              <a:t>03/11/2022</a:t>
             </a:fld>
             <a:endParaRPr lang="es-ES" noProof="0" dirty="0"/>
           </a:p>
@@ -3807,7 +3902,7 @@
             <a:fld id="{35C83AD5-F5AF-4BDC-901E-85A05CCFFAAA}" type="datetime1">
               <a:rPr lang="es-ES" noProof="0" smtClean="0"/>
               <a:pPr/>
-              <a:t>01/11/2022</a:t>
+              <a:t>03/11/2022</a:t>
             </a:fld>
             <a:endParaRPr lang="es-ES" noProof="0" dirty="0"/>
           </a:p>
@@ -4021,7 +4116,7 @@
             <a:fld id="{35C83AD5-F5AF-4BDC-901E-85A05CCFFAAA}" type="datetime1">
               <a:rPr lang="es-ES" noProof="0" smtClean="0"/>
               <a:pPr/>
-              <a:t>01/11/2022</a:t>
+              <a:t>03/11/2022</a:t>
             </a:fld>
             <a:endParaRPr lang="es-ES" noProof="0" dirty="0"/>
           </a:p>
@@ -4892,8 +4987,8 @@
         </p:nvSpPr>
         <p:spPr>
           <a:xfrm>
-            <a:off x="554398" y="1262566"/>
-            <a:ext cx="10585176" cy="5509200"/>
+            <a:off x="558059" y="1265238"/>
+            <a:ext cx="10585176" cy="1077218"/>
           </a:xfrm>
           <a:prstGeom prst="rect">
             <a:avLst/>
@@ -4909,102 +5004,430 @@
             <a:pPr algn="just"/>
             <a:r>
               <a:rPr lang="es-MX" sz="3200" b="1" dirty="0"/>
-              <a:t>Mongo DB</a:t>
+              <a:t> API </a:t>
             </a:r>
           </a:p>
           <a:p>
             <a:pPr algn="just"/>
-            <a:endParaRPr lang="es-MX" sz="3200" dirty="0"/>
-          </a:p>
-          <a:p>
-            <a:pPr algn="just"/>
-            <a:r>
-              <a:rPr lang="es-MX" sz="3200" dirty="0"/>
-              <a:t>Los datos se almacenan como </a:t>
-            </a:r>
-            <a:r>
-              <a:rPr lang="es-MX" sz="3200" b="1" dirty="0"/>
-              <a:t>colecciones y documentos</a:t>
-            </a:r>
-            <a:r>
-              <a:rPr lang="es-MX" sz="3200" dirty="0"/>
-              <a:t>.</a:t>
-            </a:r>
-          </a:p>
-          <a:p>
-            <a:pPr algn="just"/>
-            <a:r>
-              <a:rPr lang="es-MX" sz="3200" dirty="0"/>
-              <a:t>Los documentos son pares </a:t>
-            </a:r>
-            <a:r>
-              <a:rPr lang="es-MX" sz="3200" b="1" dirty="0" err="1"/>
-              <a:t>value</a:t>
-            </a:r>
-            <a:r>
-              <a:rPr lang="es-MX" sz="3200" b="1" dirty="0"/>
-              <a:t>/</a:t>
-            </a:r>
-            <a:r>
-              <a:rPr lang="es-MX" sz="3200" b="1" dirty="0" err="1"/>
-              <a:t>key</a:t>
-            </a:r>
-            <a:r>
-              <a:rPr lang="es-MX" sz="3200" b="1" dirty="0"/>
-              <a:t> </a:t>
-            </a:r>
-            <a:r>
-              <a:rPr lang="es-MX" sz="3200" dirty="0"/>
-              <a:t>que sirven como unidad básica de datos. </a:t>
-            </a:r>
-          </a:p>
-          <a:p>
-            <a:pPr algn="just"/>
-            <a:r>
-              <a:rPr lang="es-MX" sz="3200" dirty="0"/>
-              <a:t>Las colecciones contienen conjuntos de documentos y funciones.</a:t>
-            </a:r>
-          </a:p>
-          <a:p>
-            <a:pPr algn="just"/>
-            <a:endParaRPr lang="es-MX" sz="3200" dirty="0"/>
-          </a:p>
-          <a:p>
-            <a:pPr marL="457200" indent="-457200" algn="just">
-              <a:buFont typeface="Arial" panose="020B0604020202020204" pitchFamily="34" charset="0"/>
-              <a:buChar char="•"/>
-            </a:pPr>
-            <a:r>
-              <a:rPr lang="es-MX" sz="3200" dirty="0"/>
-              <a:t>Base de datos</a:t>
-            </a:r>
-          </a:p>
-          <a:p>
-            <a:pPr marL="457200" indent="-457200" algn="just">
-              <a:buFont typeface="Arial" panose="020B0604020202020204" pitchFamily="34" charset="0"/>
-              <a:buChar char="•"/>
-            </a:pPr>
-            <a:r>
-              <a:rPr lang="es-MX" sz="3200" dirty="0"/>
-              <a:t>Colecciones</a:t>
-            </a:r>
-          </a:p>
-          <a:p>
-            <a:pPr marL="457200" indent="-457200" algn="just">
-              <a:buFont typeface="Arial" panose="020B0604020202020204" pitchFamily="34" charset="0"/>
-              <a:buChar char="•"/>
-            </a:pPr>
-            <a:r>
-              <a:rPr lang="es-MX" sz="3200" dirty="0"/>
-              <a:t>Documentos</a:t>
-            </a:r>
-          </a:p>
-        </p:txBody>
-      </p:sp>
+            <a:endParaRPr lang="es-MX" sz="3200" b="1" dirty="0"/>
+          </a:p>
+        </p:txBody>
+      </p:sp>
+      <p:pic>
+        <p:nvPicPr>
+          <p:cNvPr id="5" name="Imagen 4">
+            <a:extLst>
+              <a:ext uri="{FF2B5EF4-FFF2-40B4-BE49-F238E27FC236}">
+                <a16:creationId xmlns:a16="http://schemas.microsoft.com/office/drawing/2014/main" id="{72B73DDE-0302-D9CE-CA48-C1E7E2FD019F}"/>
+              </a:ext>
+            </a:extLst>
+          </p:cNvPr>
+          <p:cNvPicPr>
+            <a:picLocks noChangeAspect="1"/>
+          </p:cNvPicPr>
+          <p:nvPr/>
+        </p:nvPicPr>
+        <p:blipFill>
+          <a:blip r:embed="rId2"/>
+          <a:stretch>
+            <a:fillRect/>
+          </a:stretch>
+        </p:blipFill>
+        <p:spPr>
+          <a:xfrm>
+            <a:off x="779771" y="2276872"/>
+            <a:ext cx="10889228" cy="4273680"/>
+          </a:xfrm>
+          <a:prstGeom prst="rect">
+            <a:avLst/>
+          </a:prstGeom>
+        </p:spPr>
+      </p:pic>
     </p:spTree>
     <p:extLst>
       <p:ext uri="{BB962C8B-B14F-4D97-AF65-F5344CB8AC3E}">
-        <p14:creationId xmlns:p14="http://schemas.microsoft.com/office/powerpoint/2010/main" val="1794111163"/>
+        <p14:creationId xmlns:p14="http://schemas.microsoft.com/office/powerpoint/2010/main" val="997958823"/>
+      </p:ext>
+    </p:extLst>
+  </p:cSld>
+  <p:clrMapOvr>
+    <a:masterClrMapping/>
+  </p:clrMapOvr>
+  <mc:AlternateContent xmlns:mc="http://schemas.openxmlformats.org/markup-compatibility/2006">
+    <mc:Choice xmlns:p14="http://schemas.microsoft.com/office/powerpoint/2010/main" Requires="p14">
+      <p:transition spd="med" p14:dur="700">
+        <p:fade/>
+      </p:transition>
+    </mc:Choice>
+    <mc:Fallback>
+      <p:transition spd="med">
+        <p:fade/>
+      </p:transition>
+    </mc:Fallback>
+  </mc:AlternateContent>
+</p:sld>
+</file>
+
+<file path=ppt/slides/slide11.xml><?xml version="1.0" encoding="utf-8"?>
+<p:sld xmlns:a="http://schemas.openxmlformats.org/drawingml/2006/main" xmlns:r="http://schemas.openxmlformats.org/officeDocument/2006/relationships" xmlns:p="http://schemas.openxmlformats.org/presentationml/2006/main">
+  <p:cSld>
+    <p:spTree>
+      <p:nvGrpSpPr>
+        <p:cNvPr id="1" name=""/>
+        <p:cNvGrpSpPr/>
+        <p:nvPr/>
+      </p:nvGrpSpPr>
+      <p:grpSpPr>
+        <a:xfrm>
+          <a:off x="0" y="0"/>
+          <a:ext cx="0" cy="0"/>
+          <a:chOff x="0" y="0"/>
+          <a:chExt cx="0" cy="0"/>
+        </a:xfrm>
+      </p:grpSpPr>
+      <p:sp>
+        <p:nvSpPr>
+          <p:cNvPr id="4" name="Título 12"/>
+          <p:cNvSpPr>
+            <a:spLocks noGrp="1"/>
+          </p:cNvSpPr>
+          <p:nvPr>
+            <p:ph type="title" idx="4294967295"/>
+          </p:nvPr>
+        </p:nvSpPr>
+        <p:spPr>
+          <a:xfrm>
+            <a:off x="5087938" y="603250"/>
+            <a:ext cx="7100887" cy="661988"/>
+          </a:xfrm>
+        </p:spPr>
+        <p:txBody>
+          <a:bodyPr rtlCol="0">
+            <a:normAutofit fontScale="90000"/>
+          </a:bodyPr>
+          <a:lstStyle/>
+          <a:p>
+            <a:pPr algn="r"/>
+            <a:r>
+              <a:rPr lang="es-ES" sz="4400" dirty="0">
+                <a:solidFill>
+                  <a:schemeClr val="accent1">
+                    <a:lumMod val="75000"/>
+                  </a:schemeClr>
+                </a:solidFill>
+                <a:effectLst>
+                  <a:outerShdw blurRad="38100" dist="38100" dir="2700000" algn="tl">
+                    <a:srgbClr val="000000">
+                      <a:alpha val="43137"/>
+                    </a:srgbClr>
+                  </a:outerShdw>
+                </a:effectLst>
+              </a:rPr>
+              <a:t>CONCEPTOS </a:t>
+            </a:r>
+          </a:p>
+        </p:txBody>
+      </p:sp>
+      <p:sp>
+        <p:nvSpPr>
+          <p:cNvPr id="2" name="Rectángulo 1"/>
+          <p:cNvSpPr/>
+          <p:nvPr/>
+        </p:nvSpPr>
+        <p:spPr>
+          <a:xfrm>
+            <a:off x="549796" y="1268760"/>
+            <a:ext cx="10081120" cy="646331"/>
+          </a:xfrm>
+          <a:prstGeom prst="rect">
+            <a:avLst/>
+          </a:prstGeom>
+        </p:spPr>
+        <p:txBody>
+          <a:bodyPr wrap="square">
+            <a:spAutoFit/>
+          </a:bodyPr>
+          <a:lstStyle/>
+          <a:p>
+            <a:endParaRPr lang="es-ES" dirty="0"/>
+          </a:p>
+        </p:txBody>
+      </p:sp>
+      <p:sp>
+        <p:nvSpPr>
+          <p:cNvPr id="8" name="CuadroTexto 7">
+            <a:extLst>
+              <a:ext uri="{FF2B5EF4-FFF2-40B4-BE49-F238E27FC236}">
+                <a16:creationId xmlns:a16="http://schemas.microsoft.com/office/drawing/2014/main" id="{7545AABF-E152-88CD-375C-B4C86233B726}"/>
+              </a:ext>
+            </a:extLst>
+          </p:cNvPr>
+          <p:cNvSpPr txBox="1"/>
+          <p:nvPr/>
+        </p:nvSpPr>
+        <p:spPr>
+          <a:xfrm>
+            <a:off x="554398" y="1262566"/>
+            <a:ext cx="10585176" cy="584775"/>
+          </a:xfrm>
+          <a:prstGeom prst="rect">
+            <a:avLst/>
+          </a:prstGeom>
+          <a:noFill/>
+        </p:spPr>
+        <p:txBody>
+          <a:bodyPr wrap="square">
+            <a:spAutoFit/>
+          </a:bodyPr>
+          <a:lstStyle/>
+          <a:p>
+            <a:pPr algn="just"/>
+            <a:r>
+              <a:rPr lang="es-MX" sz="3200" b="1" dirty="0"/>
+              <a:t>Infraestructura </a:t>
+            </a:r>
+          </a:p>
+        </p:txBody>
+      </p:sp>
+      <p:pic>
+        <p:nvPicPr>
+          <p:cNvPr id="1026" name="Picture 2" descr="Postman Public API Network Now the World's Largest Public API Hub |  Business Wire">
+            <a:extLst>
+              <a:ext uri="{FF2B5EF4-FFF2-40B4-BE49-F238E27FC236}">
+                <a16:creationId xmlns:a16="http://schemas.microsoft.com/office/drawing/2014/main" id="{0294E9A7-97D3-29E3-06A0-6C48BB3694C3}"/>
+              </a:ext>
+            </a:extLst>
+          </p:cNvPr>
+          <p:cNvPicPr>
+            <a:picLocks noChangeAspect="1" noChangeArrowheads="1"/>
+          </p:cNvPicPr>
+          <p:nvPr/>
+        </p:nvPicPr>
+        <p:blipFill>
+          <a:blip r:embed="rId2">
+            <a:extLst>
+              <a:ext uri="{28A0092B-C50C-407E-A947-70E740481C1C}">
+                <a14:useLocalDpi xmlns:a14="http://schemas.microsoft.com/office/drawing/2010/main" val="0"/>
+              </a:ext>
+            </a:extLst>
+          </a:blip>
+          <a:srcRect/>
+          <a:stretch>
+            <a:fillRect/>
+          </a:stretch>
+        </p:blipFill>
+        <p:spPr bwMode="auto">
+          <a:xfrm>
+            <a:off x="8184092" y="1762157"/>
+            <a:ext cx="4660775" cy="2330388"/>
+          </a:xfrm>
+          <a:prstGeom prst="rect">
+            <a:avLst/>
+          </a:prstGeom>
+          <a:noFill/>
+          <a:extLst>
+            <a:ext uri="{909E8E84-426E-40DD-AFC4-6F175D3DCCD1}">
+              <a14:hiddenFill xmlns:a14="http://schemas.microsoft.com/office/drawing/2010/main">
+                <a:solidFill>
+                  <a:srgbClr val="FFFFFF"/>
+                </a:solidFill>
+              </a14:hiddenFill>
+            </a:ext>
+          </a:extLst>
+        </p:spPr>
+      </p:pic>
+      <p:pic>
+        <p:nvPicPr>
+          <p:cNvPr id="1028" name="Picture 4" descr="Qué es Express.js? Todo lo que Debes Saber">
+            <a:extLst>
+              <a:ext uri="{FF2B5EF4-FFF2-40B4-BE49-F238E27FC236}">
+                <a16:creationId xmlns:a16="http://schemas.microsoft.com/office/drawing/2014/main" id="{3876EB27-FE70-D76F-4FA1-D5786B223C21}"/>
+              </a:ext>
+            </a:extLst>
+          </p:cNvPr>
+          <p:cNvPicPr>
+            <a:picLocks noChangeAspect="1" noChangeArrowheads="1"/>
+          </p:cNvPicPr>
+          <p:nvPr/>
+        </p:nvPicPr>
+        <p:blipFill>
+          <a:blip r:embed="rId3">
+            <a:extLst>
+              <a:ext uri="{28A0092B-C50C-407E-A947-70E740481C1C}">
+                <a14:useLocalDpi xmlns:a14="http://schemas.microsoft.com/office/drawing/2010/main" val="0"/>
+              </a:ext>
+            </a:extLst>
+          </a:blip>
+          <a:srcRect/>
+          <a:stretch>
+            <a:fillRect/>
+          </a:stretch>
+        </p:blipFill>
+        <p:spPr bwMode="auto">
+          <a:xfrm>
+            <a:off x="260761" y="2246534"/>
+            <a:ext cx="4156718" cy="1501037"/>
+          </a:xfrm>
+          <a:prstGeom prst="rect">
+            <a:avLst/>
+          </a:prstGeom>
+          <a:noFill/>
+          <a:extLst>
+            <a:ext uri="{909E8E84-426E-40DD-AFC4-6F175D3DCCD1}">
+              <a14:hiddenFill xmlns:a14="http://schemas.microsoft.com/office/drawing/2010/main">
+                <a:solidFill>
+                  <a:srgbClr val="FFFFFF"/>
+                </a:solidFill>
+              </a14:hiddenFill>
+            </a:ext>
+          </a:extLst>
+        </p:spPr>
+      </p:pic>
+      <p:pic>
+        <p:nvPicPr>
+          <p:cNvPr id="1030" name="Picture 6" descr="Node.js - Wikipedia, la enciclopedia libre">
+            <a:extLst>
+              <a:ext uri="{FF2B5EF4-FFF2-40B4-BE49-F238E27FC236}">
+                <a16:creationId xmlns:a16="http://schemas.microsoft.com/office/drawing/2014/main" id="{E88BCC9F-C3CA-03CF-8B72-61BE35F2CE0A}"/>
+              </a:ext>
+            </a:extLst>
+          </p:cNvPr>
+          <p:cNvPicPr>
+            <a:picLocks noChangeAspect="1" noChangeArrowheads="1"/>
+          </p:cNvPicPr>
+          <p:nvPr/>
+        </p:nvPicPr>
+        <p:blipFill>
+          <a:blip r:embed="rId4" cstate="print">
+            <a:extLst>
+              <a:ext uri="{28A0092B-C50C-407E-A947-70E740481C1C}">
+                <a14:useLocalDpi xmlns:a14="http://schemas.microsoft.com/office/drawing/2010/main" val="0"/>
+              </a:ext>
+            </a:extLst>
+          </a:blip>
+          <a:srcRect/>
+          <a:stretch>
+            <a:fillRect/>
+          </a:stretch>
+        </p:blipFill>
+        <p:spPr bwMode="auto">
+          <a:xfrm>
+            <a:off x="1485900" y="4348431"/>
+            <a:ext cx="3887438" cy="2377705"/>
+          </a:xfrm>
+          <a:prstGeom prst="rect">
+            <a:avLst/>
+          </a:prstGeom>
+          <a:noFill/>
+          <a:extLst>
+            <a:ext uri="{909E8E84-426E-40DD-AFC4-6F175D3DCCD1}">
+              <a14:hiddenFill xmlns:a14="http://schemas.microsoft.com/office/drawing/2010/main">
+                <a:solidFill>
+                  <a:srgbClr val="FFFFFF"/>
+                </a:solidFill>
+              </a14:hiddenFill>
+            </a:ext>
+          </a:extLst>
+        </p:spPr>
+      </p:pic>
+      <p:pic>
+        <p:nvPicPr>
+          <p:cNvPr id="1032" name="Picture 8" descr="JavaScript - Wikipedia, la enciclopedia libre">
+            <a:extLst>
+              <a:ext uri="{FF2B5EF4-FFF2-40B4-BE49-F238E27FC236}">
+                <a16:creationId xmlns:a16="http://schemas.microsoft.com/office/drawing/2014/main" id="{54AAF179-5705-AFB5-CF32-65E38EAF7DB1}"/>
+              </a:ext>
+            </a:extLst>
+          </p:cNvPr>
+          <p:cNvPicPr>
+            <a:picLocks noChangeAspect="1" noChangeArrowheads="1"/>
+          </p:cNvPicPr>
+          <p:nvPr/>
+        </p:nvPicPr>
+        <p:blipFill>
+          <a:blip r:embed="rId5" cstate="print">
+            <a:extLst>
+              <a:ext uri="{28A0092B-C50C-407E-A947-70E740481C1C}">
+                <a14:useLocalDpi xmlns:a14="http://schemas.microsoft.com/office/drawing/2010/main" val="0"/>
+              </a:ext>
+            </a:extLst>
+          </a:blip>
+          <a:srcRect/>
+          <a:stretch>
+            <a:fillRect/>
+          </a:stretch>
+        </p:blipFill>
+        <p:spPr bwMode="auto">
+          <a:xfrm>
+            <a:off x="5298576" y="1320716"/>
+            <a:ext cx="2204864" cy="2204864"/>
+          </a:xfrm>
+          <a:prstGeom prst="rect">
+            <a:avLst/>
+          </a:prstGeom>
+          <a:noFill/>
+          <a:extLst>
+            <a:ext uri="{909E8E84-426E-40DD-AFC4-6F175D3DCCD1}">
+              <a14:hiddenFill xmlns:a14="http://schemas.microsoft.com/office/drawing/2010/main">
+                <a:solidFill>
+                  <a:srgbClr val="FFFFFF"/>
+                </a:solidFill>
+              </a14:hiddenFill>
+            </a:ext>
+          </a:extLst>
+        </p:spPr>
+      </p:pic>
+      <p:pic>
+        <p:nvPicPr>
+          <p:cNvPr id="3" name="Picture 2" descr="Una introducción a Mongoose para MongoDB y Node.js">
+            <a:extLst>
+              <a:ext uri="{FF2B5EF4-FFF2-40B4-BE49-F238E27FC236}">
+                <a16:creationId xmlns:a16="http://schemas.microsoft.com/office/drawing/2014/main" id="{8B76EFBD-9009-501A-A0DB-0829A8634F24}"/>
+              </a:ext>
+            </a:extLst>
+          </p:cNvPr>
+          <p:cNvPicPr>
+            <a:picLocks noChangeAspect="1" noChangeArrowheads="1"/>
+          </p:cNvPicPr>
+          <p:nvPr/>
+        </p:nvPicPr>
+        <p:blipFill>
+          <a:blip r:embed="rId6">
+            <a:extLst>
+              <a:ext uri="{28A0092B-C50C-407E-A947-70E740481C1C}">
+                <a14:useLocalDpi xmlns:a14="http://schemas.microsoft.com/office/drawing/2010/main" val="0"/>
+              </a:ext>
+            </a:extLst>
+          </a:blip>
+          <a:srcRect/>
+          <a:stretch>
+            <a:fillRect/>
+          </a:stretch>
+        </p:blipFill>
+        <p:spPr bwMode="auto">
+          <a:xfrm>
+            <a:off x="7318548" y="4619086"/>
+            <a:ext cx="2801887" cy="1940307"/>
+          </a:xfrm>
+          <a:prstGeom prst="rect">
+            <a:avLst/>
+          </a:prstGeom>
+          <a:noFill/>
+          <a:extLst>
+            <a:ext uri="{909E8E84-426E-40DD-AFC4-6F175D3DCCD1}">
+              <a14:hiddenFill xmlns:a14="http://schemas.microsoft.com/office/drawing/2010/main">
+                <a:solidFill>
+                  <a:srgbClr val="FFFFFF"/>
+                </a:solidFill>
+              </a14:hiddenFill>
+            </a:ext>
+          </a:extLst>
+        </p:spPr>
+      </p:pic>
+    </p:spTree>
+    <p:extLst>
+      <p:ext uri="{BB962C8B-B14F-4D97-AF65-F5344CB8AC3E}">
+        <p14:creationId xmlns:p14="http://schemas.microsoft.com/office/powerpoint/2010/main" val="808792768"/>
       </p:ext>
     </p:extLst>
   </p:cSld>
@@ -5026,7 +5449,503 @@
 </p:sld>
 </file>
 
-<file path=ppt/slides/slide11.xml><?xml version="1.0" encoding="utf-8"?>
+<file path=ppt/slides/slide12.xml><?xml version="1.0" encoding="utf-8"?>
+<p:sld xmlns:a="http://schemas.openxmlformats.org/drawingml/2006/main" xmlns:r="http://schemas.openxmlformats.org/officeDocument/2006/relationships" xmlns:p="http://schemas.openxmlformats.org/presentationml/2006/main">
+  <p:cSld>
+    <p:spTree>
+      <p:nvGrpSpPr>
+        <p:cNvPr id="1" name=""/>
+        <p:cNvGrpSpPr/>
+        <p:nvPr/>
+      </p:nvGrpSpPr>
+      <p:grpSpPr>
+        <a:xfrm>
+          <a:off x="0" y="0"/>
+          <a:ext cx="0" cy="0"/>
+          <a:chOff x="0" y="0"/>
+          <a:chExt cx="0" cy="0"/>
+        </a:xfrm>
+      </p:grpSpPr>
+      <mc:AlternateContent xmlns:mc="http://schemas.openxmlformats.org/markup-compatibility/2006">
+        <mc:Choice xmlns:p14="http://schemas.microsoft.com/office/powerpoint/2010/main" Requires="p14">
+          <p:contentPart p14:bwMode="auto" r:id="rId2">
+            <p14:nvContentPartPr>
+              <p14:cNvPr id="2" name="Entrada de lápiz 1">
+                <a:extLst>
+                  <a:ext uri="{FF2B5EF4-FFF2-40B4-BE49-F238E27FC236}">
+                    <a16:creationId xmlns:a16="http://schemas.microsoft.com/office/drawing/2014/main" id="{C5417E03-4E73-DC91-F1D6-3F64648D0A5A}"/>
+                  </a:ext>
+                </a:extLst>
+              </p14:cNvPr>
+              <p14:cNvContentPartPr/>
+              <p14:nvPr/>
+            </p14:nvContentPartPr>
+            <p14:xfrm>
+              <a:off x="641520" y="120600"/>
+              <a:ext cx="10871280" cy="6350400"/>
+            </p14:xfrm>
+          </p:contentPart>
+        </mc:Choice>
+        <mc:Fallback>
+          <p:pic>
+            <p:nvPicPr>
+              <p:cNvPr id="2" name="Entrada de lápiz 1">
+                <a:extLst>
+                  <a:ext uri="{FF2B5EF4-FFF2-40B4-BE49-F238E27FC236}">
+                    <a16:creationId xmlns:a16="http://schemas.microsoft.com/office/drawing/2014/main" id="{C5417E03-4E73-DC91-F1D6-3F64648D0A5A}"/>
+                  </a:ext>
+                </a:extLst>
+              </p:cNvPr>
+              <p:cNvPicPr/>
+              <p:nvPr/>
+            </p:nvPicPr>
+            <p:blipFill>
+              <a:blip r:embed="rId3"/>
+              <a:stretch>
+                <a:fillRect/>
+              </a:stretch>
+            </p:blipFill>
+            <p:spPr>
+              <a:xfrm>
+                <a:off x="632160" y="111240"/>
+                <a:ext cx="10890000" cy="6369120"/>
+              </a:xfrm>
+              <a:prstGeom prst="rect">
+                <a:avLst/>
+              </a:prstGeom>
+            </p:spPr>
+          </p:pic>
+        </mc:Fallback>
+      </mc:AlternateContent>
+    </p:spTree>
+    <p:extLst>
+      <p:ext uri="{BB962C8B-B14F-4D97-AF65-F5344CB8AC3E}">
+        <p14:creationId xmlns:p14="http://schemas.microsoft.com/office/powerpoint/2010/main" val="4091284118"/>
+      </p:ext>
+    </p:extLst>
+  </p:cSld>
+  <p:clrMapOvr>
+    <a:masterClrMapping/>
+  </p:clrMapOvr>
+  <mc:AlternateContent xmlns:mc="http://schemas.openxmlformats.org/markup-compatibility/2006" xmlns:p14="http://schemas.microsoft.com/office/powerpoint/2010/main">
+    <mc:Choice Requires="p14">
+      <p:transition spd="med" p14:dur="700">
+        <p:fade/>
+      </p:transition>
+    </mc:Choice>
+    <mc:Fallback xmlns="">
+      <p:transition spd="med">
+        <p:fade/>
+      </p:transition>
+    </mc:Fallback>
+  </mc:AlternateContent>
+</p:sld>
+</file>
+
+<file path=ppt/slides/slide13.xml><?xml version="1.0" encoding="utf-8"?>
+<p:sld xmlns:a="http://schemas.openxmlformats.org/drawingml/2006/main" xmlns:r="http://schemas.openxmlformats.org/officeDocument/2006/relationships" xmlns:p="http://schemas.openxmlformats.org/presentationml/2006/main">
+  <p:cSld>
+    <p:spTree>
+      <p:nvGrpSpPr>
+        <p:cNvPr id="1" name=""/>
+        <p:cNvGrpSpPr/>
+        <p:nvPr/>
+      </p:nvGrpSpPr>
+      <p:grpSpPr>
+        <a:xfrm>
+          <a:off x="0" y="0"/>
+          <a:ext cx="0" cy="0"/>
+          <a:chOff x="0" y="0"/>
+          <a:chExt cx="0" cy="0"/>
+        </a:xfrm>
+      </p:grpSpPr>
+      <p:sp>
+        <p:nvSpPr>
+          <p:cNvPr id="4" name="Título 12"/>
+          <p:cNvSpPr>
+            <a:spLocks noGrp="1"/>
+          </p:cNvSpPr>
+          <p:nvPr>
+            <p:ph type="title" idx="4294967295"/>
+          </p:nvPr>
+        </p:nvSpPr>
+        <p:spPr>
+          <a:xfrm>
+            <a:off x="5087938" y="603250"/>
+            <a:ext cx="7100887" cy="661988"/>
+          </a:xfrm>
+        </p:spPr>
+        <p:txBody>
+          <a:bodyPr rtlCol="0">
+            <a:normAutofit fontScale="90000"/>
+          </a:bodyPr>
+          <a:lstStyle/>
+          <a:p>
+            <a:pPr algn="r"/>
+            <a:r>
+              <a:rPr lang="es-ES" sz="4400" dirty="0">
+                <a:solidFill>
+                  <a:schemeClr val="accent1">
+                    <a:lumMod val="75000"/>
+                  </a:schemeClr>
+                </a:solidFill>
+                <a:effectLst>
+                  <a:outerShdw blurRad="38100" dist="38100" dir="2700000" algn="tl">
+                    <a:srgbClr val="000000">
+                      <a:alpha val="43137"/>
+                    </a:srgbClr>
+                  </a:outerShdw>
+                </a:effectLst>
+              </a:rPr>
+              <a:t>CONCEPTOS </a:t>
+            </a:r>
+          </a:p>
+        </p:txBody>
+      </p:sp>
+      <p:sp>
+        <p:nvSpPr>
+          <p:cNvPr id="2" name="Rectángulo 1"/>
+          <p:cNvSpPr/>
+          <p:nvPr/>
+        </p:nvSpPr>
+        <p:spPr>
+          <a:xfrm>
+            <a:off x="549796" y="1268760"/>
+            <a:ext cx="10081120" cy="646331"/>
+          </a:xfrm>
+          <a:prstGeom prst="rect">
+            <a:avLst/>
+          </a:prstGeom>
+        </p:spPr>
+        <p:txBody>
+          <a:bodyPr wrap="square">
+            <a:spAutoFit/>
+          </a:bodyPr>
+          <a:lstStyle/>
+          <a:p>
+            <a:endParaRPr lang="es-ES" dirty="0"/>
+          </a:p>
+        </p:txBody>
+      </p:sp>
+      <p:sp>
+        <p:nvSpPr>
+          <p:cNvPr id="8" name="CuadroTexto 7">
+            <a:extLst>
+              <a:ext uri="{FF2B5EF4-FFF2-40B4-BE49-F238E27FC236}">
+                <a16:creationId xmlns:a16="http://schemas.microsoft.com/office/drawing/2014/main" id="{7545AABF-E152-88CD-375C-B4C86233B726}"/>
+              </a:ext>
+            </a:extLst>
+          </p:cNvPr>
+          <p:cNvSpPr txBox="1"/>
+          <p:nvPr/>
+        </p:nvSpPr>
+        <p:spPr>
+          <a:xfrm>
+            <a:off x="554398" y="1262566"/>
+            <a:ext cx="10585176" cy="3539430"/>
+          </a:xfrm>
+          <a:prstGeom prst="rect">
+            <a:avLst/>
+          </a:prstGeom>
+          <a:noFill/>
+        </p:spPr>
+        <p:txBody>
+          <a:bodyPr wrap="square">
+            <a:spAutoFit/>
+          </a:bodyPr>
+          <a:lstStyle/>
+          <a:p>
+            <a:pPr algn="just"/>
+            <a:r>
+              <a:rPr lang="es-MX" sz="3200" b="1" dirty="0"/>
+              <a:t>Infraestructura – Instalar</a:t>
+            </a:r>
+          </a:p>
+          <a:p>
+            <a:pPr algn="just"/>
+            <a:endParaRPr lang="es-MX" sz="3200" b="1" dirty="0"/>
+          </a:p>
+          <a:p>
+            <a:pPr algn="just"/>
+            <a:r>
+              <a:rPr lang="es-MX" sz="3200" b="1" dirty="0" err="1"/>
+              <a:t>npm</a:t>
+            </a:r>
+            <a:r>
+              <a:rPr lang="es-MX" sz="3200" b="1" dirty="0"/>
+              <a:t> </a:t>
+            </a:r>
+            <a:r>
+              <a:rPr lang="es-MX" sz="3200" b="1" dirty="0" err="1"/>
+              <a:t>init</a:t>
+            </a:r>
+            <a:endParaRPr lang="es-MX" sz="3200" b="1" dirty="0"/>
+          </a:p>
+          <a:p>
+            <a:pPr algn="just"/>
+            <a:r>
+              <a:rPr lang="es-MX" sz="3200" b="1" dirty="0" err="1"/>
+              <a:t>npm</a:t>
+            </a:r>
+            <a:r>
+              <a:rPr lang="es-MX" sz="3200" b="1" dirty="0"/>
+              <a:t> i </a:t>
+            </a:r>
+            <a:r>
+              <a:rPr lang="es-MX" sz="3200" b="1" dirty="0" err="1"/>
+              <a:t>mongoose</a:t>
+            </a:r>
+            <a:r>
+              <a:rPr lang="es-MX" sz="3200" b="1" dirty="0"/>
+              <a:t> </a:t>
+            </a:r>
+          </a:p>
+          <a:p>
+            <a:pPr algn="just"/>
+            <a:r>
+              <a:rPr lang="es-MX" sz="3200" b="1" dirty="0" err="1"/>
+              <a:t>npm</a:t>
+            </a:r>
+            <a:r>
+              <a:rPr lang="es-MX" sz="3200" b="1" dirty="0"/>
+              <a:t> i </a:t>
+            </a:r>
+            <a:r>
+              <a:rPr lang="es-MX" sz="3200" b="1" dirty="0" err="1"/>
+              <a:t>express</a:t>
+            </a:r>
+            <a:endParaRPr lang="es-MX" sz="3200" b="1" dirty="0"/>
+          </a:p>
+          <a:p>
+            <a:pPr algn="just"/>
+            <a:r>
+              <a:rPr lang="es-MX" sz="3200" b="1" dirty="0" err="1"/>
+              <a:t>npm</a:t>
+            </a:r>
+            <a:r>
+              <a:rPr lang="es-MX" sz="3200" b="1" dirty="0"/>
+              <a:t> </a:t>
+            </a:r>
+            <a:r>
+              <a:rPr lang="es-MX" sz="3200" b="1" dirty="0" err="1"/>
+              <a:t>install</a:t>
+            </a:r>
+            <a:r>
+              <a:rPr lang="es-MX" sz="3200" b="1" dirty="0"/>
+              <a:t> </a:t>
+            </a:r>
+            <a:r>
+              <a:rPr lang="es-MX" sz="3200" b="1" dirty="0" err="1"/>
+              <a:t>body-parser</a:t>
+            </a:r>
+            <a:endParaRPr lang="es-MX" sz="3200" b="1" dirty="0"/>
+          </a:p>
+          <a:p>
+            <a:pPr algn="just"/>
+            <a:r>
+              <a:rPr lang="es-CO" sz="3200" b="1" dirty="0" err="1"/>
+              <a:t>npm</a:t>
+            </a:r>
+            <a:r>
+              <a:rPr lang="es-CO" sz="3200" b="1" dirty="0"/>
+              <a:t> i </a:t>
+            </a:r>
+            <a:r>
+              <a:rPr lang="es-CO" sz="3200" b="1" dirty="0" err="1"/>
+              <a:t>nodemon</a:t>
+            </a:r>
+            <a:endParaRPr lang="es-MX" sz="3200" b="1" dirty="0"/>
+          </a:p>
+        </p:txBody>
+      </p:sp>
+    </p:spTree>
+    <p:extLst>
+      <p:ext uri="{BB962C8B-B14F-4D97-AF65-F5344CB8AC3E}">
+        <p14:creationId xmlns:p14="http://schemas.microsoft.com/office/powerpoint/2010/main" val="3493639757"/>
+      </p:ext>
+    </p:extLst>
+  </p:cSld>
+  <p:clrMapOvr>
+    <a:masterClrMapping/>
+  </p:clrMapOvr>
+  <mc:AlternateContent xmlns:mc="http://schemas.openxmlformats.org/markup-compatibility/2006" xmlns:p14="http://schemas.microsoft.com/office/powerpoint/2010/main">
+    <mc:Choice Requires="p14">
+      <p:transition spd="med" p14:dur="700">
+        <p:fade/>
+      </p:transition>
+    </mc:Choice>
+    <mc:Fallback xmlns="">
+      <p:transition spd="med">
+        <p:fade/>
+      </p:transition>
+    </mc:Fallback>
+  </mc:AlternateContent>
+</p:sld>
+</file>
+
+<file path=ppt/slides/slide14.xml><?xml version="1.0" encoding="utf-8"?>
+<p:sld xmlns:a="http://schemas.openxmlformats.org/drawingml/2006/main" xmlns:r="http://schemas.openxmlformats.org/officeDocument/2006/relationships" xmlns:p="http://schemas.openxmlformats.org/presentationml/2006/main">
+  <p:cSld>
+    <p:spTree>
+      <p:nvGrpSpPr>
+        <p:cNvPr id="1" name=""/>
+        <p:cNvGrpSpPr/>
+        <p:nvPr/>
+      </p:nvGrpSpPr>
+      <p:grpSpPr>
+        <a:xfrm>
+          <a:off x="0" y="0"/>
+          <a:ext cx="0" cy="0"/>
+          <a:chOff x="0" y="0"/>
+          <a:chExt cx="0" cy="0"/>
+        </a:xfrm>
+      </p:grpSpPr>
+      <p:sp>
+        <p:nvSpPr>
+          <p:cNvPr id="4" name="Título 12"/>
+          <p:cNvSpPr>
+            <a:spLocks noGrp="1"/>
+          </p:cNvSpPr>
+          <p:nvPr>
+            <p:ph type="title" idx="4294967295"/>
+          </p:nvPr>
+        </p:nvSpPr>
+        <p:spPr>
+          <a:xfrm>
+            <a:off x="5087938" y="603250"/>
+            <a:ext cx="7100887" cy="661988"/>
+          </a:xfrm>
+        </p:spPr>
+        <p:txBody>
+          <a:bodyPr rtlCol="0">
+            <a:normAutofit fontScale="90000"/>
+          </a:bodyPr>
+          <a:lstStyle/>
+          <a:p>
+            <a:pPr algn="r"/>
+            <a:r>
+              <a:rPr lang="es-ES" sz="4400" dirty="0">
+                <a:solidFill>
+                  <a:schemeClr val="accent1">
+                    <a:lumMod val="75000"/>
+                  </a:schemeClr>
+                </a:solidFill>
+                <a:effectLst>
+                  <a:outerShdw blurRad="38100" dist="38100" dir="2700000" algn="tl">
+                    <a:srgbClr val="000000">
+                      <a:alpha val="43137"/>
+                    </a:srgbClr>
+                  </a:outerShdw>
+                </a:effectLst>
+              </a:rPr>
+              <a:t>CONCEPTOS </a:t>
+            </a:r>
+          </a:p>
+        </p:txBody>
+      </p:sp>
+      <p:sp>
+        <p:nvSpPr>
+          <p:cNvPr id="2" name="Rectángulo 1"/>
+          <p:cNvSpPr/>
+          <p:nvPr/>
+        </p:nvSpPr>
+        <p:spPr>
+          <a:xfrm>
+            <a:off x="549796" y="1268760"/>
+            <a:ext cx="10081120" cy="646331"/>
+          </a:xfrm>
+          <a:prstGeom prst="rect">
+            <a:avLst/>
+          </a:prstGeom>
+        </p:spPr>
+        <p:txBody>
+          <a:bodyPr wrap="square">
+            <a:spAutoFit/>
+          </a:bodyPr>
+          <a:lstStyle/>
+          <a:p>
+            <a:endParaRPr lang="es-ES" dirty="0"/>
+          </a:p>
+        </p:txBody>
+      </p:sp>
+      <p:sp>
+        <p:nvSpPr>
+          <p:cNvPr id="8" name="CuadroTexto 7">
+            <a:extLst>
+              <a:ext uri="{FF2B5EF4-FFF2-40B4-BE49-F238E27FC236}">
+                <a16:creationId xmlns:a16="http://schemas.microsoft.com/office/drawing/2014/main" id="{7545AABF-E152-88CD-375C-B4C86233B726}"/>
+              </a:ext>
+            </a:extLst>
+          </p:cNvPr>
+          <p:cNvSpPr txBox="1"/>
+          <p:nvPr/>
+        </p:nvSpPr>
+        <p:spPr>
+          <a:xfrm>
+            <a:off x="554398" y="1262566"/>
+            <a:ext cx="10585176" cy="2062103"/>
+          </a:xfrm>
+          <a:prstGeom prst="rect">
+            <a:avLst/>
+          </a:prstGeom>
+          <a:noFill/>
+        </p:spPr>
+        <p:txBody>
+          <a:bodyPr wrap="square">
+            <a:spAutoFit/>
+          </a:bodyPr>
+          <a:lstStyle/>
+          <a:p>
+            <a:pPr algn="just"/>
+            <a:r>
+              <a:rPr lang="es-MX" sz="3200" b="1" dirty="0"/>
+              <a:t>Infraestructura – Crear modelos</a:t>
+            </a:r>
+          </a:p>
+          <a:p>
+            <a:pPr algn="just"/>
+            <a:endParaRPr lang="es-MX" sz="3200" b="1" dirty="0"/>
+          </a:p>
+          <a:p>
+            <a:pPr algn="just"/>
+            <a:r>
+              <a:rPr lang="es-MX" sz="3200" b="1" dirty="0"/>
+              <a:t>Modelo de datos es la estructura como vamos a almacenar la </a:t>
+            </a:r>
+            <a:r>
+              <a:rPr lang="es-MX" sz="3200" b="1" dirty="0" err="1"/>
+              <a:t>info</a:t>
+            </a:r>
+            <a:endParaRPr lang="es-MX" sz="3200" b="1" dirty="0"/>
+          </a:p>
+        </p:txBody>
+      </p:sp>
+    </p:spTree>
+    <p:extLst>
+      <p:ext uri="{BB962C8B-B14F-4D97-AF65-F5344CB8AC3E}">
+        <p14:creationId xmlns:p14="http://schemas.microsoft.com/office/powerpoint/2010/main" val="2913654528"/>
+      </p:ext>
+    </p:extLst>
+  </p:cSld>
+  <p:clrMapOvr>
+    <a:masterClrMapping/>
+  </p:clrMapOvr>
+  <mc:AlternateContent xmlns:mc="http://schemas.openxmlformats.org/markup-compatibility/2006" xmlns:p14="http://schemas.microsoft.com/office/powerpoint/2010/main">
+    <mc:Choice Requires="p14">
+      <p:transition spd="med" p14:dur="700">
+        <p:fade/>
+      </p:transition>
+    </mc:Choice>
+    <mc:Fallback xmlns="">
+      <p:transition spd="med">
+        <p:fade/>
+      </p:transition>
+    </mc:Fallback>
+  </mc:AlternateContent>
+</p:sld>
+</file>
+
+<file path=ppt/slides/slide15.xml><?xml version="1.0" encoding="utf-8"?>
 <p:sld xmlns:a="http://schemas.openxmlformats.org/drawingml/2006/main" xmlns:r="http://schemas.openxmlformats.org/officeDocument/2006/relationships" xmlns:p="http://schemas.openxmlformats.org/presentationml/2006/main">
   <p:cSld>
     <p:spTree>
@@ -5422,8 +6341,8 @@
           </a:p>
         </p:txBody>
       </p:sp>
-      <mc:AlternateContent xmlns:mc="http://schemas.openxmlformats.org/markup-compatibility/2006">
-        <mc:Choice xmlns:p14="http://schemas.microsoft.com/office/powerpoint/2010/main" Requires="p14">
+      <mc:AlternateContent xmlns:mc="http://schemas.openxmlformats.org/markup-compatibility/2006" xmlns:p14="http://schemas.microsoft.com/office/powerpoint/2010/main">
+        <mc:Choice Requires="p14">
           <p:contentPart p14:bwMode="auto" r:id="rId2">
             <p14:nvContentPartPr>
               <p14:cNvPr id="3" name="Entrada de lápiz 2">
@@ -5442,7 +6361,7 @@
             </p14:xfrm>
           </p:contentPart>
         </mc:Choice>
-        <mc:Fallback>
+        <mc:Fallback xmlns="">
           <p:pic>
             <p:nvPicPr>
               <p:cNvPr id="3" name="Entrada de lápiz 2">
@@ -5682,13 +6601,13 @@
   <p:clrMapOvr>
     <a:masterClrMapping/>
   </p:clrMapOvr>
-  <mc:AlternateContent xmlns:mc="http://schemas.openxmlformats.org/markup-compatibility/2006">
-    <mc:Choice xmlns:p14="http://schemas.microsoft.com/office/powerpoint/2010/main" Requires="p14">
+  <mc:AlternateContent xmlns:mc="http://schemas.openxmlformats.org/markup-compatibility/2006" xmlns:p14="http://schemas.microsoft.com/office/powerpoint/2010/main">
+    <mc:Choice Requires="p14">
       <p:transition spd="med" p14:dur="700">
         <p:fade/>
       </p:transition>
     </mc:Choice>
-    <mc:Fallback>
+    <mc:Fallback xmlns="">
       <p:transition spd="med">
         <p:fade/>
       </p:transition>
@@ -5847,7 +6766,7 @@
         </p:blipFill>
         <p:spPr bwMode="auto">
           <a:xfrm>
-            <a:off x="7273721" y="2314443"/>
+            <a:off x="8184092" y="1762157"/>
             <a:ext cx="4660775" cy="2330388"/>
           </a:xfrm>
           <a:prstGeom prst="rect">
@@ -5941,7 +6860,7 @@
         </p:blipFill>
         <p:spPr bwMode="auto">
           <a:xfrm>
-            <a:off x="3790156" y="4129243"/>
+            <a:off x="1485900" y="4348431"/>
             <a:ext cx="3887438" cy="2377705"/>
           </a:xfrm>
           <a:prstGeom prst="rect">
@@ -5988,8 +6907,55 @@
         </p:blipFill>
         <p:spPr bwMode="auto">
           <a:xfrm>
-            <a:off x="5015466" y="1457277"/>
+            <a:off x="5298576" y="1320716"/>
             <a:ext cx="2204864" cy="2204864"/>
+          </a:xfrm>
+          <a:prstGeom prst="rect">
+            <a:avLst/>
+          </a:prstGeom>
+          <a:noFill/>
+          <a:extLst>
+            <a:ext uri="{909E8E84-426E-40DD-AFC4-6F175D3DCCD1}">
+              <a14:hiddenFill xmlns:a14="http://schemas.microsoft.com/office/drawing/2010/main">
+                <a:solidFill>
+                  <a:srgbClr val="FFFFFF"/>
+                </a:solidFill>
+              </a14:hiddenFill>
+            </a:ext>
+          </a:extLst>
+        </p:spPr>
+      </p:pic>
+      <p:pic>
+        <p:nvPicPr>
+          <p:cNvPr id="3" name="Picture 2" descr="Una introducción a Mongoose para MongoDB y Node.js">
+            <a:extLst>
+              <a:ext uri="{FF2B5EF4-FFF2-40B4-BE49-F238E27FC236}">
+                <a16:creationId xmlns:a16="http://schemas.microsoft.com/office/drawing/2014/main" id="{8B76EFBD-9009-501A-A0DB-0829A8634F24}"/>
+              </a:ext>
+            </a:extLst>
+          </p:cNvPr>
+          <p:cNvPicPr>
+            <a:picLocks noChangeAspect="1" noChangeArrowheads="1"/>
+          </p:cNvPicPr>
+          <p:nvPr/>
+        </p:nvPicPr>
+        <p:blipFill>
+          <a:blip r:embed="rId6">
+            <a:extLst>
+              <a:ext uri="{28A0092B-C50C-407E-A947-70E740481C1C}">
+                <a14:useLocalDpi xmlns:a14="http://schemas.microsoft.com/office/drawing/2010/main" val="0"/>
+              </a:ext>
+            </a:extLst>
+          </a:blip>
+          <a:srcRect/>
+          <a:stretch>
+            <a:fillRect/>
+          </a:stretch>
+        </p:blipFill>
+        <p:spPr bwMode="auto">
+          <a:xfrm>
+            <a:off x="7318548" y="4619086"/>
+            <a:ext cx="2801887" cy="1940307"/>
           </a:xfrm>
           <a:prstGeom prst="rect">
             <a:avLst/>
@@ -6605,13 +7571,13 @@
   <p:clrMapOvr>
     <a:masterClrMapping/>
   </p:clrMapOvr>
-  <mc:AlternateContent xmlns:mc="http://schemas.openxmlformats.org/markup-compatibility/2006">
-    <mc:Choice xmlns:p14="http://schemas.microsoft.com/office/powerpoint/2010/main" Requires="p14">
+  <mc:AlternateContent xmlns:mc="http://schemas.openxmlformats.org/markup-compatibility/2006" xmlns:p14="http://schemas.microsoft.com/office/powerpoint/2010/main">
+    <mc:Choice Requires="p14">
       <p:transition spd="med" p14:dur="700">
         <p:fade/>
       </p:transition>
     </mc:Choice>
-    <mc:Fallback>
+    <mc:Fallback xmlns="">
       <p:transition spd="med">
         <p:fade/>
       </p:transition>
@@ -6785,13 +7751,13 @@
   <p:clrMapOvr>
     <a:masterClrMapping/>
   </p:clrMapOvr>
-  <mc:AlternateContent xmlns:mc="http://schemas.openxmlformats.org/markup-compatibility/2006">
-    <mc:Choice xmlns:p14="http://schemas.microsoft.com/office/powerpoint/2010/main" Requires="p14">
+  <mc:AlternateContent xmlns:mc="http://schemas.openxmlformats.org/markup-compatibility/2006" xmlns:p14="http://schemas.microsoft.com/office/powerpoint/2010/main">
+    <mc:Choice Requires="p14">
       <p:transition spd="med" p14:dur="700">
         <p:fade/>
       </p:transition>
     </mc:Choice>
-    <mc:Fallback>
+    <mc:Fallback xmlns="">
       <p:transition spd="med">
         <p:fade/>
       </p:transition>
@@ -7266,13 +8232,13 @@
   <p:clrMapOvr>
     <a:masterClrMapping/>
   </p:clrMapOvr>
-  <mc:AlternateContent xmlns:mc="http://schemas.openxmlformats.org/markup-compatibility/2006">
-    <mc:Choice xmlns:p14="http://schemas.microsoft.com/office/powerpoint/2010/main" Requires="p14">
+  <mc:AlternateContent xmlns:mc="http://schemas.openxmlformats.org/markup-compatibility/2006" xmlns:p14="http://schemas.microsoft.com/office/powerpoint/2010/main">
+    <mc:Choice Requires="p14">
       <p:transition spd="med" p14:dur="700">
         <p:fade/>
       </p:transition>
     </mc:Choice>
-    <mc:Fallback>
+    <mc:Fallback xmlns="">
       <p:transition spd="med">
         <p:fade/>
       </p:transition>

</xml_diff>